<commit_message>
Finished 2D MOT section, moving onto rubidium updates to apparatus
</commit_message>
<xml_diff>
--- a/BEC_DFG figures/2D MOT pictures.pptx
+++ b/BEC_DFG figures/2D MOT pictures.pptx
@@ -9,6 +9,7 @@
     <p:sldId id="256" r:id="rId3"/>
     <p:sldId id="258" r:id="rId4"/>
     <p:sldId id="259" r:id="rId5"/>
+    <p:sldId id="260" r:id="rId6"/>
   </p:sldIdLst>
   <p:sldSz cx="12192000" cy="6858000"/>
   <p:notesSz cx="6858000" cy="9144000"/>
@@ -107,6 +108,11 @@
       </a:defRPr>
     </a:lvl9pPr>
   </p:defaultTextStyle>
+  <p:extLst>
+    <p:ext uri="{EFAFB233-063F-42B5-8137-9DF3F51BA10A}">
+      <p15:sldGuideLst xmlns:p15="http://schemas.microsoft.com/office/powerpoint/2012/main"/>
+    </p:ext>
+  </p:extLst>
 </p:presentation>
 </file>
 
@@ -241,7 +247,7 @@
           <a:p>
             <a:fld id="{B76106A0-2D27-4EED-8823-794999301753}" type="datetimeFigureOut">
               <a:rPr lang="en-US" smtClean="0"/>
-              <a:t>12/14/2018</a:t>
+              <a:t>12/19/2018</a:t>
             </a:fld>
             <a:endParaRPr lang="en-US"/>
           </a:p>
@@ -411,7 +417,7 @@
           <a:p>
             <a:fld id="{B76106A0-2D27-4EED-8823-794999301753}" type="datetimeFigureOut">
               <a:rPr lang="en-US" smtClean="0"/>
-              <a:t>12/14/2018</a:t>
+              <a:t>12/19/2018</a:t>
             </a:fld>
             <a:endParaRPr lang="en-US"/>
           </a:p>
@@ -591,7 +597,7 @@
           <a:p>
             <a:fld id="{B76106A0-2D27-4EED-8823-794999301753}" type="datetimeFigureOut">
               <a:rPr lang="en-US" smtClean="0"/>
-              <a:t>12/14/2018</a:t>
+              <a:t>12/19/2018</a:t>
             </a:fld>
             <a:endParaRPr lang="en-US"/>
           </a:p>
@@ -761,7 +767,7 @@
           <a:p>
             <a:fld id="{B76106A0-2D27-4EED-8823-794999301753}" type="datetimeFigureOut">
               <a:rPr lang="en-US" smtClean="0"/>
-              <a:t>12/14/2018</a:t>
+              <a:t>12/19/2018</a:t>
             </a:fld>
             <a:endParaRPr lang="en-US"/>
           </a:p>
@@ -1007,7 +1013,7 @@
           <a:p>
             <a:fld id="{B76106A0-2D27-4EED-8823-794999301753}" type="datetimeFigureOut">
               <a:rPr lang="en-US" smtClean="0"/>
-              <a:t>12/14/2018</a:t>
+              <a:t>12/19/2018</a:t>
             </a:fld>
             <a:endParaRPr lang="en-US"/>
           </a:p>
@@ -1239,7 +1245,7 @@
           <a:p>
             <a:fld id="{B76106A0-2D27-4EED-8823-794999301753}" type="datetimeFigureOut">
               <a:rPr lang="en-US" smtClean="0"/>
-              <a:t>12/14/2018</a:t>
+              <a:t>12/19/2018</a:t>
             </a:fld>
             <a:endParaRPr lang="en-US"/>
           </a:p>
@@ -1606,7 +1612,7 @@
           <a:p>
             <a:fld id="{B76106A0-2D27-4EED-8823-794999301753}" type="datetimeFigureOut">
               <a:rPr lang="en-US" smtClean="0"/>
-              <a:t>12/14/2018</a:t>
+              <a:t>12/19/2018</a:t>
             </a:fld>
             <a:endParaRPr lang="en-US"/>
           </a:p>
@@ -1724,7 +1730,7 @@
           <a:p>
             <a:fld id="{B76106A0-2D27-4EED-8823-794999301753}" type="datetimeFigureOut">
               <a:rPr lang="en-US" smtClean="0"/>
-              <a:t>12/14/2018</a:t>
+              <a:t>12/19/2018</a:t>
             </a:fld>
             <a:endParaRPr lang="en-US"/>
           </a:p>
@@ -1819,7 +1825,7 @@
           <a:p>
             <a:fld id="{B76106A0-2D27-4EED-8823-794999301753}" type="datetimeFigureOut">
               <a:rPr lang="en-US" smtClean="0"/>
-              <a:t>12/14/2018</a:t>
+              <a:t>12/19/2018</a:t>
             </a:fld>
             <a:endParaRPr lang="en-US"/>
           </a:p>
@@ -2096,7 +2102,7 @@
           <a:p>
             <a:fld id="{B76106A0-2D27-4EED-8823-794999301753}" type="datetimeFigureOut">
               <a:rPr lang="en-US" smtClean="0"/>
-              <a:t>12/14/2018</a:t>
+              <a:t>12/19/2018</a:t>
             </a:fld>
             <a:endParaRPr lang="en-US"/>
           </a:p>
@@ -2349,7 +2355,7 @@
           <a:p>
             <a:fld id="{B76106A0-2D27-4EED-8823-794999301753}" type="datetimeFigureOut">
               <a:rPr lang="en-US" smtClean="0"/>
-              <a:t>12/14/2018</a:t>
+              <a:t>12/19/2018</a:t>
             </a:fld>
             <a:endParaRPr lang="en-US"/>
           </a:p>
@@ -2562,7 +2568,7 @@
           <a:p>
             <a:fld id="{B76106A0-2D27-4EED-8823-794999301753}" type="datetimeFigureOut">
               <a:rPr lang="en-US" smtClean="0"/>
-              <a:t>12/14/2018</a:t>
+              <a:t>12/19/2018</a:t>
             </a:fld>
             <a:endParaRPr lang="en-US"/>
           </a:p>
@@ -3048,7 +3054,7 @@
           </p:nvSpPr>
           <p:spPr>
             <a:xfrm>
-              <a:off x="8266386" y="4862856"/>
+              <a:off x="8266386" y="4901493"/>
               <a:ext cx="1046825" cy="276999"/>
             </a:xfrm>
             <a:prstGeom prst="rect">
@@ -3203,7 +3209,7 @@
           <p:spPr>
             <a:xfrm>
               <a:off x="4463094" y="1565631"/>
-              <a:ext cx="875561" cy="276999"/>
+              <a:ext cx="875561" cy="461665"/>
             </a:xfrm>
             <a:prstGeom prst="rect">
               <a:avLst/>
@@ -3219,6 +3225,12 @@
               <a:r>
                 <a:rPr lang="en-US" sz="1200" dirty="0" smtClean="0"/>
                 <a:t>Push beam</a:t>
+              </a:r>
+            </a:p>
+            <a:p>
+              <a:r>
+                <a:rPr lang="en-US" sz="1200" dirty="0" smtClean="0"/>
+                <a:t>optics</a:t>
               </a:r>
               <a:endParaRPr lang="en-US" sz="1200" dirty="0"/>
             </a:p>
@@ -3476,7 +3488,7 @@
       </p:grpSpPr>
       <p:grpSp>
         <p:nvGrpSpPr>
-          <p:cNvPr id="24" name="Group 23"/>
+          <p:cNvPr id="8" name="Group 7"/>
           <p:cNvGrpSpPr/>
           <p:nvPr/>
         </p:nvGrpSpPr>
@@ -3488,450 +3500,501 @@
             <a:chExt cx="5486400" cy="3079242"/>
           </a:xfrm>
         </p:grpSpPr>
-        <p:pic>
-          <p:nvPicPr>
-            <p:cNvPr id="2" name="Picture 1"/>
-            <p:cNvPicPr>
-              <a:picLocks noChangeAspect="1"/>
-            </p:cNvPicPr>
+        <p:grpSp>
+          <p:nvGrpSpPr>
+            <p:cNvPr id="24" name="Group 23"/>
+            <p:cNvGrpSpPr/>
             <p:nvPr/>
-          </p:nvPicPr>
-          <p:blipFill>
-            <a:blip r:embed="rId2" cstate="print">
-              <a:extLst>
-                <a:ext uri="{28A0092B-C50C-407E-A947-70E740481C1C}">
-                  <a14:useLocalDpi xmlns:a14="http://schemas.microsoft.com/office/drawing/2010/main" val="0"/>
-                </a:ext>
-              </a:extLst>
-            </a:blip>
-            <a:stretch>
-              <a:fillRect/>
-            </a:stretch>
-          </p:blipFill>
-          <p:spPr>
+          </p:nvGrpSpPr>
+          <p:grpSpPr>
             <a:xfrm>
               <a:off x="3174274" y="1575163"/>
               <a:ext cx="5486400" cy="3079242"/>
+              <a:chOff x="3174274" y="1575163"/>
+              <a:chExt cx="5486400" cy="3079242"/>
             </a:xfrm>
-            <a:prstGeom prst="rect">
-              <a:avLst/>
-            </a:prstGeom>
-          </p:spPr>
-        </p:pic>
-        <p:sp>
-          <p:nvSpPr>
-            <p:cNvPr id="3" name="TextBox 2"/>
-            <p:cNvSpPr txBox="1"/>
-            <p:nvPr/>
-          </p:nvSpPr>
-          <p:spPr>
-            <a:xfrm>
-              <a:off x="5368625" y="1802674"/>
-              <a:ext cx="639149" cy="276999"/>
-            </a:xfrm>
-            <a:prstGeom prst="rect">
-              <a:avLst/>
-            </a:prstGeom>
-            <a:noFill/>
-          </p:spPr>
-          <p:txBody>
-            <a:bodyPr wrap="none" rtlCol="0">
-              <a:spAutoFit/>
-            </a:bodyPr>
-            <a:lstStyle/>
-            <a:p>
-              <a:r>
-                <a:rPr lang="en-US" sz="1200" dirty="0" smtClean="0">
+          </p:grpSpPr>
+          <p:pic>
+            <p:nvPicPr>
+              <p:cNvPr id="2" name="Picture 1"/>
+              <p:cNvPicPr>
+                <a:picLocks noChangeAspect="1"/>
+              </p:cNvPicPr>
+              <p:nvPr/>
+            </p:nvPicPr>
+            <p:blipFill>
+              <a:blip r:embed="rId2" cstate="print">
+                <a:extLst>
+                  <a:ext uri="{28A0092B-C50C-407E-A947-70E740481C1C}">
+                    <a14:useLocalDpi xmlns:a14="http://schemas.microsoft.com/office/drawing/2010/main" val="0"/>
+                  </a:ext>
+                </a:extLst>
+              </a:blip>
+              <a:stretch>
+                <a:fillRect/>
+              </a:stretch>
+            </p:blipFill>
+            <p:spPr>
+              <a:xfrm>
+                <a:off x="3174274" y="1575163"/>
+                <a:ext cx="5486400" cy="3079242"/>
+              </a:xfrm>
+              <a:prstGeom prst="rect">
+                <a:avLst/>
+              </a:prstGeom>
+            </p:spPr>
+          </p:pic>
+          <p:sp>
+            <p:nvSpPr>
+              <p:cNvPr id="3" name="TextBox 2"/>
+              <p:cNvSpPr txBox="1"/>
+              <p:nvPr/>
+            </p:nvSpPr>
+            <p:spPr>
+              <a:xfrm>
+                <a:off x="5368625" y="1802674"/>
+                <a:ext cx="648767" cy="276999"/>
+              </a:xfrm>
+              <a:prstGeom prst="rect">
+                <a:avLst/>
+              </a:prstGeom>
+              <a:noFill/>
+            </p:spPr>
+            <p:txBody>
+              <a:bodyPr wrap="none" rtlCol="0">
+                <a:spAutoFit/>
+              </a:bodyPr>
+              <a:lstStyle/>
+              <a:p>
+                <a:r>
+                  <a:rPr lang="en-US" sz="1200" b="1" dirty="0" smtClean="0">
+                    <a:solidFill>
+                      <a:schemeClr val="bg1"/>
+                    </a:solidFill>
+                  </a:rPr>
+                  <a:t>Clamps</a:t>
+                </a:r>
+                <a:endParaRPr lang="en-US" sz="1200" b="1" dirty="0">
                   <a:solidFill>
-                    <a:srgbClr val="FF0000"/>
+                    <a:schemeClr val="bg1"/>
                   </a:solidFill>
-                </a:rPr>
-                <a:t>Clamps</a:t>
-              </a:r>
-              <a:endParaRPr lang="en-US" sz="1200" dirty="0">
+                </a:endParaRPr>
+              </a:p>
+            </p:txBody>
+          </p:sp>
+          <p:sp>
+            <p:nvSpPr>
+              <p:cNvPr id="4" name="TextBox 3"/>
+              <p:cNvSpPr txBox="1"/>
+              <p:nvPr/>
+            </p:nvSpPr>
+            <p:spPr>
+              <a:xfrm>
+                <a:off x="3225594" y="3398223"/>
+                <a:ext cx="957506" cy="461665"/>
+              </a:xfrm>
+              <a:prstGeom prst="rect">
+                <a:avLst/>
+              </a:prstGeom>
+              <a:noFill/>
+            </p:spPr>
+            <p:txBody>
+              <a:bodyPr wrap="none" rtlCol="0">
+                <a:spAutoFit/>
+              </a:bodyPr>
+              <a:lstStyle/>
+              <a:p>
+                <a:r>
+                  <a:rPr lang="en-US" sz="1200" b="1" dirty="0" smtClean="0">
+                    <a:solidFill>
+                      <a:schemeClr val="bg1"/>
+                    </a:solidFill>
+                  </a:rPr>
+                  <a:t>Mini </a:t>
+                </a:r>
+                <a:r>
+                  <a:rPr lang="en-US" sz="1200" b="1" dirty="0" err="1" smtClean="0">
+                    <a:solidFill>
+                      <a:schemeClr val="bg1"/>
+                    </a:solidFill>
+                  </a:rPr>
+                  <a:t>conflat</a:t>
+                </a:r>
+                <a:endParaRPr lang="en-US" sz="1200" b="1" dirty="0" smtClean="0">
+                  <a:solidFill>
+                    <a:schemeClr val="bg1"/>
+                  </a:solidFill>
+                </a:endParaRPr>
+              </a:p>
+              <a:p>
+                <a:r>
+                  <a:rPr lang="en-US" sz="1200" b="1" dirty="0" smtClean="0">
+                    <a:solidFill>
+                      <a:schemeClr val="bg1"/>
+                    </a:solidFill>
+                  </a:rPr>
+                  <a:t>connector</a:t>
+                </a:r>
+                <a:endParaRPr lang="en-US" sz="1200" b="1" dirty="0">
+                  <a:solidFill>
+                    <a:schemeClr val="bg1"/>
+                  </a:solidFill>
+                </a:endParaRPr>
+              </a:p>
+            </p:txBody>
+          </p:sp>
+          <p:cxnSp>
+            <p:nvCxnSpPr>
+              <p:cNvPr id="6" name="Straight Arrow Connector 5"/>
+              <p:cNvCxnSpPr>
+                <a:stCxn id="3" idx="3"/>
+              </p:cNvCxnSpPr>
+              <p:nvPr/>
+            </p:nvCxnSpPr>
+            <p:spPr>
+              <a:xfrm>
+                <a:off x="6017392" y="1941174"/>
+                <a:ext cx="877481" cy="145723"/>
+              </a:xfrm>
+              <a:prstGeom prst="straightConnector1">
+                <a:avLst/>
+              </a:prstGeom>
+              <a:ln w="12700">
                 <a:solidFill>
                   <a:srgbClr val="FF0000"/>
                 </a:solidFill>
-              </a:endParaRPr>
-            </a:p>
-          </p:txBody>
-        </p:sp>
-        <p:sp>
-          <p:nvSpPr>
-            <p:cNvPr id="4" name="TextBox 3"/>
-            <p:cNvSpPr txBox="1"/>
-            <p:nvPr/>
-          </p:nvSpPr>
-          <p:spPr>
-            <a:xfrm>
-              <a:off x="3225594" y="3398223"/>
-              <a:ext cx="932884" cy="461665"/>
-            </a:xfrm>
-            <a:prstGeom prst="rect">
-              <a:avLst/>
-            </a:prstGeom>
-            <a:noFill/>
-          </p:spPr>
-          <p:txBody>
-            <a:bodyPr wrap="none" rtlCol="0">
-              <a:spAutoFit/>
-            </a:bodyPr>
-            <a:lstStyle/>
-            <a:p>
-              <a:r>
-                <a:rPr lang="en-US" sz="1200" dirty="0" smtClean="0">
-                  <a:solidFill>
-                    <a:srgbClr val="FF0000"/>
-                  </a:solidFill>
-                </a:rPr>
-                <a:t>Mini </a:t>
-              </a:r>
-              <a:r>
-                <a:rPr lang="en-US" sz="1200" dirty="0" err="1" smtClean="0">
-                  <a:solidFill>
-                    <a:srgbClr val="FF0000"/>
-                  </a:solidFill>
-                </a:rPr>
-                <a:t>conflat</a:t>
-              </a:r>
-              <a:endParaRPr lang="en-US" sz="1200" dirty="0" smtClean="0">
+                <a:tailEnd type="triangle"/>
+              </a:ln>
+            </p:spPr>
+            <p:style>
+              <a:lnRef idx="1">
+                <a:schemeClr val="accent1"/>
+              </a:lnRef>
+              <a:fillRef idx="0">
+                <a:schemeClr val="accent1"/>
+              </a:fillRef>
+              <a:effectRef idx="0">
+                <a:schemeClr val="accent1"/>
+              </a:effectRef>
+              <a:fontRef idx="minor">
+                <a:schemeClr val="tx1"/>
+              </a:fontRef>
+            </p:style>
+          </p:cxnSp>
+          <p:cxnSp>
+            <p:nvCxnSpPr>
+              <p:cNvPr id="7" name="Straight Arrow Connector 6"/>
+              <p:cNvCxnSpPr>
+                <a:stCxn id="3" idx="1"/>
+              </p:cNvCxnSpPr>
+              <p:nvPr/>
+            </p:nvCxnSpPr>
+            <p:spPr>
+              <a:xfrm flipH="1">
+                <a:off x="4697361" y="1941174"/>
+                <a:ext cx="671264" cy="366010"/>
+              </a:xfrm>
+              <a:prstGeom prst="straightConnector1">
+                <a:avLst/>
+              </a:prstGeom>
+              <a:ln w="12700">
                 <a:solidFill>
                   <a:srgbClr val="FF0000"/>
                 </a:solidFill>
-              </a:endParaRPr>
-            </a:p>
-            <a:p>
-              <a:r>
-                <a:rPr lang="en-US" sz="1200" dirty="0" smtClean="0">
+                <a:tailEnd type="triangle"/>
+              </a:ln>
+            </p:spPr>
+            <p:style>
+              <a:lnRef idx="1">
+                <a:schemeClr val="accent1"/>
+              </a:lnRef>
+              <a:fillRef idx="0">
+                <a:schemeClr val="accent1"/>
+              </a:fillRef>
+              <a:effectRef idx="0">
+                <a:schemeClr val="accent1"/>
+              </a:effectRef>
+              <a:fontRef idx="minor">
+                <a:schemeClr val="tx1"/>
+              </a:fontRef>
+            </p:style>
+          </p:cxnSp>
+          <p:sp>
+            <p:nvSpPr>
+              <p:cNvPr id="11" name="TextBox 10"/>
+              <p:cNvSpPr txBox="1"/>
+              <p:nvPr/>
+            </p:nvSpPr>
+            <p:spPr>
+              <a:xfrm>
+                <a:off x="7667595" y="2971923"/>
+                <a:ext cx="947888" cy="646331"/>
+              </a:xfrm>
+              <a:prstGeom prst="rect">
+                <a:avLst/>
+              </a:prstGeom>
+              <a:noFill/>
+            </p:spPr>
+            <p:txBody>
+              <a:bodyPr wrap="none" rtlCol="0">
+                <a:spAutoFit/>
+              </a:bodyPr>
+              <a:lstStyle/>
+              <a:p>
+                <a:r>
+                  <a:rPr lang="en-US" sz="1200" b="1" dirty="0" smtClean="0">
+                    <a:solidFill>
+                      <a:schemeClr val="bg1"/>
+                    </a:solidFill>
+                  </a:rPr>
+                  <a:t>Rotatable</a:t>
+                </a:r>
+              </a:p>
+              <a:p>
+                <a:r>
+                  <a:rPr lang="en-US" sz="1200" b="1" dirty="0">
+                    <a:solidFill>
+                      <a:schemeClr val="bg1"/>
+                    </a:solidFill>
+                  </a:rPr>
+                  <a:t>m</a:t>
+                </a:r>
+                <a:r>
+                  <a:rPr lang="en-US" sz="1200" b="1" dirty="0" smtClean="0">
+                    <a:solidFill>
+                      <a:schemeClr val="bg1"/>
+                    </a:solidFill>
+                  </a:rPr>
+                  <a:t>ini </a:t>
+                </a:r>
+                <a:r>
+                  <a:rPr lang="en-US" sz="1200" b="1" dirty="0" err="1" smtClean="0">
+                    <a:solidFill>
+                      <a:schemeClr val="bg1"/>
+                    </a:solidFill>
+                  </a:rPr>
+                  <a:t>conflat</a:t>
+                </a:r>
+                <a:endParaRPr lang="en-US" sz="1200" b="1" dirty="0" smtClean="0">
                   <a:solidFill>
-                    <a:srgbClr val="FF0000"/>
+                    <a:schemeClr val="bg1"/>
                   </a:solidFill>
-                </a:rPr>
-                <a:t>connector</a:t>
-              </a:r>
-              <a:endParaRPr lang="en-US" sz="1200" dirty="0">
+                </a:endParaRPr>
+              </a:p>
+              <a:p>
+                <a:r>
+                  <a:rPr lang="en-US" sz="1200" b="1" dirty="0" smtClean="0">
+                    <a:solidFill>
+                      <a:schemeClr val="bg1"/>
+                    </a:solidFill>
+                  </a:rPr>
+                  <a:t>connector</a:t>
+                </a:r>
+                <a:endParaRPr lang="en-US" sz="1200" b="1" dirty="0">
+                  <a:solidFill>
+                    <a:schemeClr val="bg1"/>
+                  </a:solidFill>
+                </a:endParaRPr>
+              </a:p>
+            </p:txBody>
+          </p:sp>
+          <p:sp>
+            <p:nvSpPr>
+              <p:cNvPr id="12" name="TextBox 11"/>
+              <p:cNvSpPr txBox="1"/>
+              <p:nvPr/>
+            </p:nvSpPr>
+            <p:spPr>
+              <a:xfrm>
+                <a:off x="5032993" y="3582889"/>
+                <a:ext cx="1013547" cy="276999"/>
+              </a:xfrm>
+              <a:prstGeom prst="rect">
+                <a:avLst/>
+              </a:prstGeom>
+              <a:noFill/>
+            </p:spPr>
+            <p:txBody>
+              <a:bodyPr wrap="none" rtlCol="0">
+                <a:spAutoFit/>
+              </a:bodyPr>
+              <a:lstStyle/>
+              <a:p>
+                <a:r>
+                  <a:rPr lang="en-US" sz="1200" b="1" dirty="0" smtClean="0">
+                    <a:solidFill>
+                      <a:schemeClr val="bg1"/>
+                    </a:solidFill>
+                  </a:rPr>
+                  <a:t>Stainless Cell</a:t>
+                </a:r>
+                <a:endParaRPr lang="en-US" sz="1200" b="1" dirty="0">
+                  <a:solidFill>
+                    <a:schemeClr val="bg1"/>
+                  </a:solidFill>
+                </a:endParaRPr>
+              </a:p>
+            </p:txBody>
+          </p:sp>
+          <p:sp>
+            <p:nvSpPr>
+              <p:cNvPr id="13" name="TextBox 12"/>
+              <p:cNvSpPr txBox="1"/>
+              <p:nvPr/>
+            </p:nvSpPr>
+            <p:spPr>
+              <a:xfrm>
+                <a:off x="6347092" y="3490555"/>
+                <a:ext cx="1445717" cy="276999"/>
+              </a:xfrm>
+              <a:prstGeom prst="rect">
+                <a:avLst/>
+              </a:prstGeom>
+              <a:noFill/>
+            </p:spPr>
+            <p:txBody>
+              <a:bodyPr wrap="none" rtlCol="0">
+                <a:spAutoFit/>
+              </a:bodyPr>
+              <a:lstStyle/>
+              <a:p>
+                <a:r>
+                  <a:rPr lang="en-US" sz="1200" b="1" dirty="0" smtClean="0">
+                    <a:solidFill>
+                      <a:schemeClr val="bg1"/>
+                    </a:solidFill>
+                  </a:rPr>
+                  <a:t>AR coated windows</a:t>
+                </a:r>
+                <a:endParaRPr lang="en-US" sz="1200" b="1" dirty="0">
+                  <a:solidFill>
+                    <a:schemeClr val="bg1"/>
+                  </a:solidFill>
+                </a:endParaRPr>
+              </a:p>
+            </p:txBody>
+          </p:sp>
+          <p:cxnSp>
+            <p:nvCxnSpPr>
+              <p:cNvPr id="14" name="Straight Arrow Connector 13"/>
+              <p:cNvCxnSpPr>
+                <a:stCxn id="12" idx="0"/>
+              </p:cNvCxnSpPr>
+              <p:nvPr/>
+            </p:nvCxnSpPr>
+            <p:spPr>
+              <a:xfrm flipH="1" flipV="1">
+                <a:off x="5529155" y="3437951"/>
+                <a:ext cx="10612" cy="144938"/>
+              </a:xfrm>
+              <a:prstGeom prst="straightConnector1">
+                <a:avLst/>
+              </a:prstGeom>
+              <a:ln w="12700">
                 <a:solidFill>
                   <a:srgbClr val="FF0000"/>
                 </a:solidFill>
-              </a:endParaRPr>
-            </a:p>
-          </p:txBody>
-        </p:sp>
-        <p:cxnSp>
-          <p:nvCxnSpPr>
-            <p:cNvPr id="6" name="Straight Arrow Connector 5"/>
-            <p:cNvCxnSpPr>
-              <a:stCxn id="3" idx="3"/>
-            </p:cNvCxnSpPr>
-            <p:nvPr/>
-          </p:nvCxnSpPr>
-          <p:spPr>
-            <a:xfrm>
-              <a:off x="6007774" y="1941174"/>
-              <a:ext cx="887099" cy="145723"/>
-            </a:xfrm>
-            <a:prstGeom prst="straightConnector1">
-              <a:avLst/>
-            </a:prstGeom>
-            <a:ln w="12700">
-              <a:solidFill>
-                <a:srgbClr val="FF0000"/>
-              </a:solidFill>
-              <a:tailEnd type="triangle"/>
-            </a:ln>
-          </p:spPr>
-          <p:style>
-            <a:lnRef idx="1">
-              <a:schemeClr val="accent1"/>
-            </a:lnRef>
-            <a:fillRef idx="0">
-              <a:schemeClr val="accent1"/>
-            </a:fillRef>
-            <a:effectRef idx="0">
-              <a:schemeClr val="accent1"/>
-            </a:effectRef>
-            <a:fontRef idx="minor">
-              <a:schemeClr val="tx1"/>
-            </a:fontRef>
-          </p:style>
-        </p:cxnSp>
-        <p:cxnSp>
-          <p:nvCxnSpPr>
-            <p:cNvPr id="7" name="Straight Arrow Connector 6"/>
-            <p:cNvCxnSpPr>
-              <a:stCxn id="3" idx="1"/>
-            </p:cNvCxnSpPr>
-            <p:nvPr/>
-          </p:nvCxnSpPr>
-          <p:spPr>
-            <a:xfrm flipH="1">
-              <a:off x="4697361" y="1941174"/>
-              <a:ext cx="671264" cy="366010"/>
-            </a:xfrm>
-            <a:prstGeom prst="straightConnector1">
-              <a:avLst/>
-            </a:prstGeom>
-            <a:ln w="12700">
-              <a:solidFill>
-                <a:srgbClr val="FF0000"/>
-              </a:solidFill>
-              <a:tailEnd type="triangle"/>
-            </a:ln>
-          </p:spPr>
-          <p:style>
-            <a:lnRef idx="1">
-              <a:schemeClr val="accent1"/>
-            </a:lnRef>
-            <a:fillRef idx="0">
-              <a:schemeClr val="accent1"/>
-            </a:fillRef>
-            <a:effectRef idx="0">
-              <a:schemeClr val="accent1"/>
-            </a:effectRef>
-            <a:fontRef idx="minor">
-              <a:schemeClr val="tx1"/>
-            </a:fontRef>
-          </p:style>
-        </p:cxnSp>
-        <p:sp>
-          <p:nvSpPr>
-            <p:cNvPr id="11" name="TextBox 10"/>
-            <p:cNvSpPr txBox="1"/>
-            <p:nvPr/>
-          </p:nvSpPr>
-          <p:spPr>
-            <a:xfrm>
-              <a:off x="7500168" y="2791618"/>
-              <a:ext cx="924869" cy="646331"/>
-            </a:xfrm>
-            <a:prstGeom prst="rect">
-              <a:avLst/>
-            </a:prstGeom>
-            <a:noFill/>
-          </p:spPr>
-          <p:txBody>
-            <a:bodyPr wrap="none" rtlCol="0">
-              <a:spAutoFit/>
-            </a:bodyPr>
-            <a:lstStyle/>
-            <a:p>
-              <a:r>
-                <a:rPr lang="en-US" sz="1200" dirty="0" smtClean="0">
-                  <a:solidFill>
-                    <a:srgbClr val="FF0000"/>
-                  </a:solidFill>
-                </a:rPr>
-                <a:t>Rotatable</a:t>
-              </a:r>
-            </a:p>
-            <a:p>
-              <a:r>
-                <a:rPr lang="en-US" sz="1200" dirty="0">
-                  <a:solidFill>
-                    <a:srgbClr val="FF0000"/>
-                  </a:solidFill>
-                </a:rPr>
-                <a:t>m</a:t>
-              </a:r>
-              <a:r>
-                <a:rPr lang="en-US" sz="1200" dirty="0" smtClean="0">
-                  <a:solidFill>
-                    <a:srgbClr val="FF0000"/>
-                  </a:solidFill>
-                </a:rPr>
-                <a:t>ini </a:t>
-              </a:r>
-              <a:r>
-                <a:rPr lang="en-US" sz="1200" dirty="0" err="1" smtClean="0">
-                  <a:solidFill>
-                    <a:srgbClr val="FF0000"/>
-                  </a:solidFill>
-                </a:rPr>
-                <a:t>conflat</a:t>
-              </a:r>
-              <a:endParaRPr lang="en-US" sz="1200" dirty="0" smtClean="0">
+                <a:tailEnd type="triangle"/>
+              </a:ln>
+            </p:spPr>
+            <p:style>
+              <a:lnRef idx="1">
+                <a:schemeClr val="accent1"/>
+              </a:lnRef>
+              <a:fillRef idx="0">
+                <a:schemeClr val="accent1"/>
+              </a:fillRef>
+              <a:effectRef idx="0">
+                <a:schemeClr val="accent1"/>
+              </a:effectRef>
+              <a:fontRef idx="minor">
+                <a:schemeClr val="tx1"/>
+              </a:fontRef>
+            </p:style>
+          </p:cxnSp>
+          <p:cxnSp>
+            <p:nvCxnSpPr>
+              <p:cNvPr id="17" name="Straight Arrow Connector 16"/>
+              <p:cNvCxnSpPr/>
+              <p:nvPr/>
+            </p:nvCxnSpPr>
+            <p:spPr>
+              <a:xfrm flipH="1" flipV="1">
+                <a:off x="6555659" y="2452908"/>
+                <a:ext cx="634180" cy="1129981"/>
+              </a:xfrm>
+              <a:prstGeom prst="straightConnector1">
+                <a:avLst/>
+              </a:prstGeom>
+              <a:ln w="12700">
                 <a:solidFill>
                   <a:srgbClr val="FF0000"/>
                 </a:solidFill>
-              </a:endParaRPr>
-            </a:p>
-            <a:p>
-              <a:r>
-                <a:rPr lang="en-US" sz="1200" dirty="0" smtClean="0">
-                  <a:solidFill>
-                    <a:srgbClr val="FF0000"/>
-                  </a:solidFill>
-                </a:rPr>
-                <a:t>connector</a:t>
-              </a:r>
-              <a:endParaRPr lang="en-US" sz="1200" dirty="0">
+                <a:tailEnd type="triangle"/>
+              </a:ln>
+            </p:spPr>
+            <p:style>
+              <a:lnRef idx="1">
+                <a:schemeClr val="accent1"/>
+              </a:lnRef>
+              <a:fillRef idx="0">
+                <a:schemeClr val="accent1"/>
+              </a:fillRef>
+              <a:effectRef idx="0">
+                <a:schemeClr val="accent1"/>
+              </a:effectRef>
+              <a:fontRef idx="minor">
+                <a:schemeClr val="tx1"/>
+              </a:fontRef>
+            </p:style>
+          </p:cxnSp>
+          <p:cxnSp>
+            <p:nvCxnSpPr>
+              <p:cNvPr id="20" name="Straight Arrow Connector 19"/>
+              <p:cNvCxnSpPr/>
+              <p:nvPr/>
+            </p:nvCxnSpPr>
+            <p:spPr>
+              <a:xfrm flipH="1" flipV="1">
+                <a:off x="6555659" y="3021444"/>
+                <a:ext cx="634180" cy="561446"/>
+              </a:xfrm>
+              <a:prstGeom prst="straightConnector1">
+                <a:avLst/>
+              </a:prstGeom>
+              <a:ln w="12700">
                 <a:solidFill>
                   <a:srgbClr val="FF0000"/>
                 </a:solidFill>
-              </a:endParaRPr>
-            </a:p>
-          </p:txBody>
-        </p:sp>
-        <p:sp>
-          <p:nvSpPr>
-            <p:cNvPr id="12" name="TextBox 11"/>
-            <p:cNvSpPr txBox="1"/>
-            <p:nvPr/>
-          </p:nvSpPr>
-          <p:spPr>
-            <a:xfrm>
-              <a:off x="5032993" y="3582889"/>
-              <a:ext cx="992323" cy="276999"/>
-            </a:xfrm>
-            <a:prstGeom prst="rect">
-              <a:avLst/>
-            </a:prstGeom>
-            <a:noFill/>
-          </p:spPr>
-          <p:txBody>
-            <a:bodyPr wrap="none" rtlCol="0">
-              <a:spAutoFit/>
-            </a:bodyPr>
-            <a:lstStyle/>
-            <a:p>
-              <a:r>
-                <a:rPr lang="en-US" sz="1200" dirty="0" smtClean="0">
-                  <a:solidFill>
-                    <a:srgbClr val="FF0000"/>
-                  </a:solidFill>
-                </a:rPr>
-                <a:t>Stainless Cell</a:t>
-              </a:r>
-              <a:endParaRPr lang="en-US" sz="1200" dirty="0">
-                <a:solidFill>
-                  <a:srgbClr val="FF0000"/>
-                </a:solidFill>
-              </a:endParaRPr>
-            </a:p>
-          </p:txBody>
-        </p:sp>
-        <p:sp>
-          <p:nvSpPr>
-            <p:cNvPr id="13" name="TextBox 12"/>
-            <p:cNvSpPr txBox="1"/>
-            <p:nvPr/>
-          </p:nvSpPr>
-          <p:spPr>
-            <a:xfrm>
-              <a:off x="6347092" y="3490555"/>
-              <a:ext cx="1411092" cy="276999"/>
-            </a:xfrm>
-            <a:prstGeom prst="rect">
-              <a:avLst/>
-            </a:prstGeom>
-            <a:noFill/>
-          </p:spPr>
-          <p:txBody>
-            <a:bodyPr wrap="none" rtlCol="0">
-              <a:spAutoFit/>
-            </a:bodyPr>
-            <a:lstStyle/>
-            <a:p>
-              <a:r>
-                <a:rPr lang="en-US" sz="1200" dirty="0" smtClean="0">
-                  <a:solidFill>
-                    <a:srgbClr val="FF0000"/>
-                  </a:solidFill>
-                </a:rPr>
-                <a:t>AR coated windows</a:t>
-              </a:r>
-              <a:endParaRPr lang="en-US" sz="1200" dirty="0">
-                <a:solidFill>
-                  <a:srgbClr val="FF0000"/>
-                </a:solidFill>
-              </a:endParaRPr>
-            </a:p>
-          </p:txBody>
-        </p:sp>
+                <a:tailEnd type="triangle"/>
+              </a:ln>
+            </p:spPr>
+            <p:style>
+              <a:lnRef idx="1">
+                <a:schemeClr val="accent1"/>
+              </a:lnRef>
+              <a:fillRef idx="0">
+                <a:schemeClr val="accent1"/>
+              </a:fillRef>
+              <a:effectRef idx="0">
+                <a:schemeClr val="accent1"/>
+              </a:effectRef>
+              <a:fontRef idx="minor">
+                <a:schemeClr val="tx1"/>
+              </a:fontRef>
+            </p:style>
+          </p:cxnSp>
+        </p:grpSp>
         <p:cxnSp>
           <p:nvCxnSpPr>
-            <p:cNvPr id="14" name="Straight Arrow Connector 13"/>
-            <p:cNvCxnSpPr>
-              <a:stCxn id="12" idx="0"/>
-            </p:cNvCxnSpPr>
-            <p:nvPr/>
-          </p:nvCxnSpPr>
-          <p:spPr>
-            <a:xfrm flipV="1">
-              <a:off x="5529155" y="3437950"/>
-              <a:ext cx="0" cy="144939"/>
-            </a:xfrm>
-            <a:prstGeom prst="straightConnector1">
-              <a:avLst/>
-            </a:prstGeom>
-            <a:ln w="12700">
-              <a:solidFill>
-                <a:srgbClr val="FF0000"/>
-              </a:solidFill>
-              <a:tailEnd type="triangle"/>
-            </a:ln>
-          </p:spPr>
-          <p:style>
-            <a:lnRef idx="1">
-              <a:schemeClr val="accent1"/>
-            </a:lnRef>
-            <a:fillRef idx="0">
-              <a:schemeClr val="accent1"/>
-            </a:fillRef>
-            <a:effectRef idx="0">
-              <a:schemeClr val="accent1"/>
-            </a:effectRef>
-            <a:fontRef idx="minor">
-              <a:schemeClr val="tx1"/>
-            </a:fontRef>
-          </p:style>
-        </p:cxnSp>
-        <p:cxnSp>
-          <p:nvCxnSpPr>
-            <p:cNvPr id="17" name="Straight Arrow Connector 16"/>
+            <p:cNvPr id="15" name="Straight Arrow Connector 14"/>
             <p:cNvCxnSpPr/>
             <p:nvPr/>
           </p:nvCxnSpPr>
           <p:spPr>
             <a:xfrm flipH="1" flipV="1">
-              <a:off x="6555659" y="2452908"/>
-              <a:ext cx="634180" cy="1129981"/>
-            </a:xfrm>
-            <a:prstGeom prst="straightConnector1">
-              <a:avLst/>
-            </a:prstGeom>
-            <a:ln w="12700">
-              <a:solidFill>
-                <a:srgbClr val="FF0000"/>
-              </a:solidFill>
-              <a:tailEnd type="triangle"/>
-            </a:ln>
-          </p:spPr>
-          <p:style>
-            <a:lnRef idx="1">
-              <a:schemeClr val="accent1"/>
-            </a:lnRef>
-            <a:fillRef idx="0">
-              <a:schemeClr val="accent1"/>
-            </a:fillRef>
-            <a:effectRef idx="0">
-              <a:schemeClr val="accent1"/>
-            </a:effectRef>
-            <a:fontRef idx="minor">
-              <a:schemeClr val="tx1"/>
-            </a:fontRef>
-          </p:style>
-        </p:cxnSp>
-        <p:cxnSp>
-          <p:nvCxnSpPr>
-            <p:cNvPr id="20" name="Straight Arrow Connector 19"/>
-            <p:cNvCxnSpPr/>
-            <p:nvPr/>
-          </p:nvCxnSpPr>
-          <p:spPr>
-            <a:xfrm flipH="1" flipV="1">
-              <a:off x="6555659" y="3021444"/>
-              <a:ext cx="634180" cy="561446"/>
+              <a:off x="7667595" y="2601532"/>
+              <a:ext cx="421616" cy="412542"/>
             </a:xfrm>
             <a:prstGeom prst="straightConnector1">
               <a:avLst/>
@@ -3989,40 +4052,1466 @@
           <a:chExt cx="0" cy="0"/>
         </a:xfrm>
       </p:grpSpPr>
-      <p:pic>
-        <p:nvPicPr>
-          <p:cNvPr id="2" name="Picture 1"/>
-          <p:cNvPicPr>
-            <a:picLocks noChangeAspect="1"/>
-          </p:cNvPicPr>
+      <p:grpSp>
+        <p:nvGrpSpPr>
+          <p:cNvPr id="28" name="Group 27"/>
+          <p:cNvGrpSpPr/>
           <p:nvPr/>
-        </p:nvPicPr>
-        <p:blipFill>
-          <a:blip r:embed="rId2" cstate="print">
-            <a:extLst>
-              <a:ext uri="{28A0092B-C50C-407E-A947-70E740481C1C}">
-                <a14:useLocalDpi xmlns:a14="http://schemas.microsoft.com/office/drawing/2010/main" val="0"/>
-              </a:ext>
-            </a:extLst>
-          </a:blip>
-          <a:stretch>
-            <a:fillRect/>
-          </a:stretch>
-        </p:blipFill>
-        <p:spPr>
+        </p:nvGrpSpPr>
+        <p:grpSpPr>
           <a:xfrm>
             <a:off x="3122023" y="2037805"/>
             <a:ext cx="5486400" cy="3086100"/>
+            <a:chOff x="3122023" y="2037805"/>
+            <a:chExt cx="5486400" cy="3086100"/>
           </a:xfrm>
-          <a:prstGeom prst="rect">
-            <a:avLst/>
-          </a:prstGeom>
-        </p:spPr>
-      </p:pic>
+        </p:grpSpPr>
+        <p:pic>
+          <p:nvPicPr>
+            <p:cNvPr id="2" name="Picture 1"/>
+            <p:cNvPicPr>
+              <a:picLocks noChangeAspect="1"/>
+            </p:cNvPicPr>
+            <p:nvPr/>
+          </p:nvPicPr>
+          <p:blipFill>
+            <a:blip r:embed="rId2" cstate="print">
+              <a:extLst>
+                <a:ext uri="{28A0092B-C50C-407E-A947-70E740481C1C}">
+                  <a14:useLocalDpi xmlns:a14="http://schemas.microsoft.com/office/drawing/2010/main" val="0"/>
+                </a:ext>
+              </a:extLst>
+            </a:blip>
+            <a:stretch>
+              <a:fillRect/>
+            </a:stretch>
+          </p:blipFill>
+          <p:spPr>
+            <a:xfrm>
+              <a:off x="3122023" y="2037805"/>
+              <a:ext cx="5486400" cy="3086100"/>
+            </a:xfrm>
+            <a:prstGeom prst="rect">
+              <a:avLst/>
+            </a:prstGeom>
+          </p:spPr>
+        </p:pic>
+        <p:sp>
+          <p:nvSpPr>
+            <p:cNvPr id="3" name="TextBox 2"/>
+            <p:cNvSpPr txBox="1"/>
+            <p:nvPr/>
+          </p:nvSpPr>
+          <p:spPr>
+            <a:xfrm>
+              <a:off x="5480948" y="2037805"/>
+              <a:ext cx="836319" cy="276999"/>
+            </a:xfrm>
+            <a:prstGeom prst="rect">
+              <a:avLst/>
+            </a:prstGeom>
+            <a:noFill/>
+          </p:spPr>
+          <p:txBody>
+            <a:bodyPr wrap="none" rtlCol="0">
+              <a:spAutoFit/>
+            </a:bodyPr>
+            <a:lstStyle/>
+            <a:p>
+              <a:r>
+                <a:rPr lang="en-US" sz="1200" b="1" dirty="0" err="1" smtClean="0">
+                  <a:solidFill>
+                    <a:schemeClr val="bg1"/>
+                  </a:solidFill>
+                </a:rPr>
+                <a:t>biasZ</a:t>
+              </a:r>
+              <a:r>
+                <a:rPr lang="en-US" sz="1200" b="1" dirty="0" smtClean="0">
+                  <a:solidFill>
+                    <a:schemeClr val="bg1"/>
+                  </a:solidFill>
+                </a:rPr>
+                <a:t> coils</a:t>
+              </a:r>
+              <a:endParaRPr lang="en-US" sz="1200" b="1" dirty="0">
+                <a:solidFill>
+                  <a:schemeClr val="bg1"/>
+                </a:solidFill>
+              </a:endParaRPr>
+            </a:p>
+          </p:txBody>
+        </p:sp>
+        <p:sp>
+          <p:nvSpPr>
+            <p:cNvPr id="4" name="TextBox 3"/>
+            <p:cNvSpPr txBox="1"/>
+            <p:nvPr/>
+          </p:nvSpPr>
+          <p:spPr>
+            <a:xfrm>
+              <a:off x="7704521" y="4315219"/>
+              <a:ext cx="852349" cy="276999"/>
+            </a:xfrm>
+            <a:prstGeom prst="rect">
+              <a:avLst/>
+            </a:prstGeom>
+            <a:noFill/>
+          </p:spPr>
+          <p:txBody>
+            <a:bodyPr wrap="none" rtlCol="0">
+              <a:spAutoFit/>
+            </a:bodyPr>
+            <a:lstStyle/>
+            <a:p>
+              <a:r>
+                <a:rPr lang="en-US" sz="1200" b="1" dirty="0" smtClean="0">
+                  <a:solidFill>
+                    <a:schemeClr val="bg1"/>
+                  </a:solidFill>
+                </a:rPr>
+                <a:t>Quad coils</a:t>
+              </a:r>
+              <a:endParaRPr lang="en-US" sz="1200" b="1" dirty="0">
+                <a:solidFill>
+                  <a:schemeClr val="bg1"/>
+                </a:solidFill>
+              </a:endParaRPr>
+            </a:p>
+          </p:txBody>
+        </p:sp>
+        <p:sp>
+          <p:nvSpPr>
+            <p:cNvPr id="5" name="TextBox 4"/>
+            <p:cNvSpPr txBox="1"/>
+            <p:nvPr/>
+          </p:nvSpPr>
+          <p:spPr>
+            <a:xfrm>
+              <a:off x="3761439" y="3350020"/>
+              <a:ext cx="1229824" cy="461665"/>
+            </a:xfrm>
+            <a:prstGeom prst="rect">
+              <a:avLst/>
+            </a:prstGeom>
+            <a:noFill/>
+          </p:spPr>
+          <p:txBody>
+            <a:bodyPr wrap="none" rtlCol="0">
+              <a:spAutoFit/>
+            </a:bodyPr>
+            <a:lstStyle/>
+            <a:p>
+              <a:r>
+                <a:rPr lang="en-US" sz="1200" b="1" dirty="0" smtClean="0">
+                  <a:solidFill>
+                    <a:schemeClr val="bg1"/>
+                  </a:solidFill>
+                </a:rPr>
+                <a:t>Retro-reflection </a:t>
+              </a:r>
+            </a:p>
+            <a:p>
+              <a:r>
+                <a:rPr lang="en-US" sz="1200" b="1" dirty="0" smtClean="0">
+                  <a:solidFill>
+                    <a:schemeClr val="bg1"/>
+                  </a:solidFill>
+                </a:rPr>
+                <a:t>mirrors</a:t>
+              </a:r>
+              <a:endParaRPr lang="en-US" sz="1200" b="1" dirty="0">
+                <a:solidFill>
+                  <a:schemeClr val="bg1"/>
+                </a:solidFill>
+              </a:endParaRPr>
+            </a:p>
+          </p:txBody>
+        </p:sp>
+        <p:sp>
+          <p:nvSpPr>
+            <p:cNvPr id="6" name="TextBox 5"/>
+            <p:cNvSpPr txBox="1"/>
+            <p:nvPr/>
+          </p:nvSpPr>
+          <p:spPr>
+            <a:xfrm>
+              <a:off x="7704521" y="3350021"/>
+              <a:ext cx="903902" cy="461665"/>
+            </a:xfrm>
+            <a:prstGeom prst="rect">
+              <a:avLst/>
+            </a:prstGeom>
+            <a:noFill/>
+          </p:spPr>
+          <p:txBody>
+            <a:bodyPr wrap="none" rtlCol="0">
+              <a:spAutoFit/>
+            </a:bodyPr>
+            <a:lstStyle/>
+            <a:p>
+              <a:r>
+                <a:rPr lang="en-US" sz="1200" b="1" dirty="0" smtClean="0">
+                  <a:solidFill>
+                    <a:schemeClr val="bg1"/>
+                  </a:solidFill>
+                </a:rPr>
+                <a:t>Quarter </a:t>
+              </a:r>
+            </a:p>
+            <a:p>
+              <a:r>
+                <a:rPr lang="en-US" sz="1200" b="1" dirty="0" err="1" smtClean="0">
+                  <a:solidFill>
+                    <a:schemeClr val="bg1"/>
+                  </a:solidFill>
+                </a:rPr>
+                <a:t>waveplates</a:t>
+              </a:r>
+              <a:endParaRPr lang="en-US" sz="1200" b="1" dirty="0">
+                <a:solidFill>
+                  <a:schemeClr val="bg1"/>
+                </a:solidFill>
+              </a:endParaRPr>
+            </a:p>
+          </p:txBody>
+        </p:sp>
+        <p:cxnSp>
+          <p:nvCxnSpPr>
+            <p:cNvPr id="8" name="Straight Arrow Connector 7"/>
+            <p:cNvCxnSpPr>
+              <a:stCxn id="3" idx="3"/>
+            </p:cNvCxnSpPr>
+            <p:nvPr/>
+          </p:nvCxnSpPr>
+          <p:spPr>
+            <a:xfrm>
+              <a:off x="6317267" y="2176305"/>
+              <a:ext cx="2041122" cy="138499"/>
+            </a:xfrm>
+            <a:prstGeom prst="straightConnector1">
+              <a:avLst/>
+            </a:prstGeom>
+            <a:ln w="28575">
+              <a:solidFill>
+                <a:schemeClr val="bg1"/>
+              </a:solidFill>
+              <a:tailEnd type="triangle"/>
+            </a:ln>
+          </p:spPr>
+          <p:style>
+            <a:lnRef idx="1">
+              <a:schemeClr val="accent1"/>
+            </a:lnRef>
+            <a:fillRef idx="0">
+              <a:schemeClr val="accent1"/>
+            </a:fillRef>
+            <a:effectRef idx="0">
+              <a:schemeClr val="accent1"/>
+            </a:effectRef>
+            <a:fontRef idx="minor">
+              <a:schemeClr val="tx1"/>
+            </a:fontRef>
+          </p:style>
+        </p:cxnSp>
+        <p:cxnSp>
+          <p:nvCxnSpPr>
+            <p:cNvPr id="9" name="Straight Arrow Connector 8"/>
+            <p:cNvCxnSpPr/>
+            <p:nvPr/>
+          </p:nvCxnSpPr>
+          <p:spPr>
+            <a:xfrm flipH="1">
+              <a:off x="4146997" y="2176305"/>
+              <a:ext cx="1333951" cy="138499"/>
+            </a:xfrm>
+            <a:prstGeom prst="straightConnector1">
+              <a:avLst/>
+            </a:prstGeom>
+            <a:ln w="28575">
+              <a:solidFill>
+                <a:schemeClr val="bg1"/>
+              </a:solidFill>
+              <a:tailEnd type="triangle"/>
+            </a:ln>
+          </p:spPr>
+          <p:style>
+            <a:lnRef idx="1">
+              <a:schemeClr val="accent1"/>
+            </a:lnRef>
+            <a:fillRef idx="0">
+              <a:schemeClr val="accent1"/>
+            </a:fillRef>
+            <a:effectRef idx="0">
+              <a:schemeClr val="accent1"/>
+            </a:effectRef>
+            <a:fontRef idx="minor">
+              <a:schemeClr val="tx1"/>
+            </a:fontRef>
+          </p:style>
+        </p:cxnSp>
+        <p:cxnSp>
+          <p:nvCxnSpPr>
+            <p:cNvPr id="12" name="Straight Arrow Connector 11"/>
+            <p:cNvCxnSpPr/>
+            <p:nvPr/>
+          </p:nvCxnSpPr>
+          <p:spPr>
+            <a:xfrm flipV="1">
+              <a:off x="4844662" y="3245762"/>
+              <a:ext cx="889049" cy="141682"/>
+            </a:xfrm>
+            <a:prstGeom prst="straightConnector1">
+              <a:avLst/>
+            </a:prstGeom>
+            <a:ln w="28575">
+              <a:solidFill>
+                <a:schemeClr val="bg1"/>
+              </a:solidFill>
+              <a:tailEnd type="triangle"/>
+            </a:ln>
+          </p:spPr>
+          <p:style>
+            <a:lnRef idx="1">
+              <a:schemeClr val="accent1"/>
+            </a:lnRef>
+            <a:fillRef idx="0">
+              <a:schemeClr val="accent1"/>
+            </a:fillRef>
+            <a:effectRef idx="0">
+              <a:schemeClr val="accent1"/>
+            </a:effectRef>
+            <a:fontRef idx="minor">
+              <a:schemeClr val="tx1"/>
+            </a:fontRef>
+          </p:style>
+        </p:cxnSp>
+        <p:cxnSp>
+          <p:nvCxnSpPr>
+            <p:cNvPr id="14" name="Straight Arrow Connector 13"/>
+            <p:cNvCxnSpPr/>
+            <p:nvPr/>
+          </p:nvCxnSpPr>
+          <p:spPr>
+            <a:xfrm>
+              <a:off x="4359441" y="3697860"/>
+              <a:ext cx="727714" cy="894358"/>
+            </a:xfrm>
+            <a:prstGeom prst="straightConnector1">
+              <a:avLst/>
+            </a:prstGeom>
+            <a:ln w="28575">
+              <a:solidFill>
+                <a:schemeClr val="bg1"/>
+              </a:solidFill>
+              <a:tailEnd type="triangle"/>
+            </a:ln>
+          </p:spPr>
+          <p:style>
+            <a:lnRef idx="1">
+              <a:schemeClr val="accent1"/>
+            </a:lnRef>
+            <a:fillRef idx="0">
+              <a:schemeClr val="accent1"/>
+            </a:fillRef>
+            <a:effectRef idx="0">
+              <a:schemeClr val="accent1"/>
+            </a:effectRef>
+            <a:fontRef idx="minor">
+              <a:schemeClr val="tx1"/>
+            </a:fontRef>
+          </p:style>
+        </p:cxnSp>
+        <p:cxnSp>
+          <p:nvCxnSpPr>
+            <p:cNvPr id="16" name="Straight Arrow Connector 15"/>
+            <p:cNvCxnSpPr>
+              <a:stCxn id="4" idx="0"/>
+            </p:cNvCxnSpPr>
+            <p:nvPr/>
+          </p:nvCxnSpPr>
+          <p:spPr>
+            <a:xfrm flipH="1" flipV="1">
+              <a:off x="7337828" y="3697860"/>
+              <a:ext cx="792868" cy="617359"/>
+            </a:xfrm>
+            <a:prstGeom prst="straightConnector1">
+              <a:avLst/>
+            </a:prstGeom>
+            <a:ln w="28575">
+              <a:solidFill>
+                <a:schemeClr val="bg1"/>
+              </a:solidFill>
+              <a:tailEnd type="triangle"/>
+            </a:ln>
+          </p:spPr>
+          <p:style>
+            <a:lnRef idx="1">
+              <a:schemeClr val="accent1"/>
+            </a:lnRef>
+            <a:fillRef idx="0">
+              <a:schemeClr val="accent1"/>
+            </a:fillRef>
+            <a:effectRef idx="0">
+              <a:schemeClr val="accent1"/>
+            </a:effectRef>
+            <a:fontRef idx="minor">
+              <a:schemeClr val="tx1"/>
+            </a:fontRef>
+          </p:style>
+        </p:cxnSp>
+        <p:cxnSp>
+          <p:nvCxnSpPr>
+            <p:cNvPr id="19" name="Straight Arrow Connector 18"/>
+            <p:cNvCxnSpPr/>
+            <p:nvPr/>
+          </p:nvCxnSpPr>
+          <p:spPr>
+            <a:xfrm flipH="1" flipV="1">
+              <a:off x="7286275" y="4102203"/>
+              <a:ext cx="844420" cy="189834"/>
+            </a:xfrm>
+            <a:prstGeom prst="straightConnector1">
+              <a:avLst/>
+            </a:prstGeom>
+            <a:ln w="28575">
+              <a:solidFill>
+                <a:schemeClr val="bg1"/>
+              </a:solidFill>
+              <a:tailEnd type="triangle"/>
+            </a:ln>
+          </p:spPr>
+          <p:style>
+            <a:lnRef idx="1">
+              <a:schemeClr val="accent1"/>
+            </a:lnRef>
+            <a:fillRef idx="0">
+              <a:schemeClr val="accent1"/>
+            </a:fillRef>
+            <a:effectRef idx="0">
+              <a:schemeClr val="accent1"/>
+            </a:effectRef>
+            <a:fontRef idx="minor">
+              <a:schemeClr val="tx1"/>
+            </a:fontRef>
+          </p:style>
+        </p:cxnSp>
+        <p:cxnSp>
+          <p:nvCxnSpPr>
+            <p:cNvPr id="22" name="Straight Arrow Connector 21"/>
+            <p:cNvCxnSpPr>
+              <a:stCxn id="6" idx="1"/>
+            </p:cNvCxnSpPr>
+            <p:nvPr/>
+          </p:nvCxnSpPr>
+          <p:spPr>
+            <a:xfrm flipH="1" flipV="1">
+              <a:off x="7018986" y="3420861"/>
+              <a:ext cx="685535" cy="159993"/>
+            </a:xfrm>
+            <a:prstGeom prst="straightConnector1">
+              <a:avLst/>
+            </a:prstGeom>
+            <a:ln w="28575">
+              <a:solidFill>
+                <a:schemeClr val="bg1"/>
+              </a:solidFill>
+              <a:tailEnd type="triangle"/>
+            </a:ln>
+          </p:spPr>
+          <p:style>
+            <a:lnRef idx="1">
+              <a:schemeClr val="accent1"/>
+            </a:lnRef>
+            <a:fillRef idx="0">
+              <a:schemeClr val="accent1"/>
+            </a:fillRef>
+            <a:effectRef idx="0">
+              <a:schemeClr val="accent1"/>
+            </a:effectRef>
+            <a:fontRef idx="minor">
+              <a:schemeClr val="tx1"/>
+            </a:fontRef>
+          </p:style>
+        </p:cxnSp>
+        <p:cxnSp>
+          <p:nvCxnSpPr>
+            <p:cNvPr id="25" name="Straight Arrow Connector 24"/>
+            <p:cNvCxnSpPr>
+              <a:stCxn id="6" idx="1"/>
+            </p:cNvCxnSpPr>
+            <p:nvPr/>
+          </p:nvCxnSpPr>
+          <p:spPr>
+            <a:xfrm flipH="1">
+              <a:off x="5630679" y="3580854"/>
+              <a:ext cx="2073842" cy="851371"/>
+            </a:xfrm>
+            <a:prstGeom prst="straightConnector1">
+              <a:avLst/>
+            </a:prstGeom>
+            <a:ln w="28575">
+              <a:solidFill>
+                <a:schemeClr val="bg1"/>
+              </a:solidFill>
+              <a:tailEnd type="triangle"/>
+            </a:ln>
+          </p:spPr>
+          <p:style>
+            <a:lnRef idx="1">
+              <a:schemeClr val="accent1"/>
+            </a:lnRef>
+            <a:fillRef idx="0">
+              <a:schemeClr val="accent1"/>
+            </a:fillRef>
+            <a:effectRef idx="0">
+              <a:schemeClr val="accent1"/>
+            </a:effectRef>
+            <a:fontRef idx="minor">
+              <a:schemeClr val="tx1"/>
+            </a:fontRef>
+          </p:style>
+        </p:cxnSp>
+      </p:grpSp>
     </p:spTree>
     <p:extLst>
       <p:ext uri="{BB962C8B-B14F-4D97-AF65-F5344CB8AC3E}">
         <p14:creationId xmlns:p14="http://schemas.microsoft.com/office/powerpoint/2010/main" val="2735385892"/>
+      </p:ext>
+    </p:extLst>
+  </p:cSld>
+  <p:clrMapOvr>
+    <a:masterClrMapping/>
+  </p:clrMapOvr>
+</p:sld>
+</file>
+
+<file path=ppt/slides/slide5.xml><?xml version="1.0" encoding="utf-8"?>
+<p:sld xmlns:a="http://schemas.openxmlformats.org/drawingml/2006/main" xmlns:r="http://schemas.openxmlformats.org/officeDocument/2006/relationships" xmlns:p="http://schemas.openxmlformats.org/presentationml/2006/main">
+  <p:cSld>
+    <p:spTree>
+      <p:nvGrpSpPr>
+        <p:cNvPr id="1" name=""/>
+        <p:cNvGrpSpPr/>
+        <p:nvPr/>
+      </p:nvGrpSpPr>
+      <p:grpSpPr>
+        <a:xfrm>
+          <a:off x="0" y="0"/>
+          <a:ext cx="0" cy="0"/>
+          <a:chOff x="0" y="0"/>
+          <a:chExt cx="0" cy="0"/>
+        </a:xfrm>
+      </p:grpSpPr>
+      <p:grpSp>
+        <p:nvGrpSpPr>
+          <p:cNvPr id="63" name="Group 62"/>
+          <p:cNvGrpSpPr/>
+          <p:nvPr/>
+        </p:nvGrpSpPr>
+        <p:grpSpPr>
+          <a:xfrm>
+            <a:off x="3206840" y="2343957"/>
+            <a:ext cx="5486400" cy="3086100"/>
+            <a:chOff x="3206840" y="2343957"/>
+            <a:chExt cx="5486400" cy="3086100"/>
+          </a:xfrm>
+        </p:grpSpPr>
+        <p:pic>
+          <p:nvPicPr>
+            <p:cNvPr id="3" name="Picture 2"/>
+            <p:cNvPicPr>
+              <a:picLocks noChangeAspect="1"/>
+            </p:cNvPicPr>
+            <p:nvPr/>
+          </p:nvPicPr>
+          <p:blipFill>
+            <a:blip r:embed="rId2" cstate="print">
+              <a:extLst>
+                <a:ext uri="{28A0092B-C50C-407E-A947-70E740481C1C}">
+                  <a14:useLocalDpi xmlns:a14="http://schemas.microsoft.com/office/drawing/2010/main" val="0"/>
+                </a:ext>
+              </a:extLst>
+            </a:blip>
+            <a:stretch>
+              <a:fillRect/>
+            </a:stretch>
+          </p:blipFill>
+          <p:spPr>
+            <a:xfrm>
+              <a:off x="3206840" y="2343957"/>
+              <a:ext cx="5486400" cy="3086100"/>
+            </a:xfrm>
+            <a:prstGeom prst="rect">
+              <a:avLst/>
+            </a:prstGeom>
+          </p:spPr>
+        </p:pic>
+        <p:sp>
+          <p:nvSpPr>
+            <p:cNvPr id="17" name="TextBox 16"/>
+            <p:cNvSpPr txBox="1"/>
+            <p:nvPr/>
+          </p:nvSpPr>
+          <p:spPr>
+            <a:xfrm>
+              <a:off x="5379884" y="3098166"/>
+              <a:ext cx="852349" cy="276999"/>
+            </a:xfrm>
+            <a:prstGeom prst="rect">
+              <a:avLst/>
+            </a:prstGeom>
+            <a:noFill/>
+          </p:spPr>
+          <p:txBody>
+            <a:bodyPr wrap="none" rtlCol="0">
+              <a:spAutoFit/>
+            </a:bodyPr>
+            <a:lstStyle/>
+            <a:p>
+              <a:r>
+                <a:rPr lang="en-US" sz="1200" b="1" dirty="0" smtClean="0">
+                  <a:solidFill>
+                    <a:schemeClr val="bg1"/>
+                  </a:solidFill>
+                </a:rPr>
+                <a:t>Quad coils</a:t>
+              </a:r>
+              <a:endParaRPr lang="en-US" sz="1200" b="1" dirty="0">
+                <a:solidFill>
+                  <a:schemeClr val="bg1"/>
+                </a:solidFill>
+              </a:endParaRPr>
+            </a:p>
+          </p:txBody>
+        </p:sp>
+        <p:cxnSp>
+          <p:nvCxnSpPr>
+            <p:cNvPr id="18" name="Straight Arrow Connector 17"/>
+            <p:cNvCxnSpPr>
+              <a:stCxn id="17" idx="2"/>
+            </p:cNvCxnSpPr>
+            <p:nvPr/>
+          </p:nvCxnSpPr>
+          <p:spPr>
+            <a:xfrm flipH="1">
+              <a:off x="5743741" y="3375165"/>
+              <a:ext cx="62318" cy="447179"/>
+            </a:xfrm>
+            <a:prstGeom prst="straightConnector1">
+              <a:avLst/>
+            </a:prstGeom>
+            <a:ln w="28575">
+              <a:solidFill>
+                <a:schemeClr val="bg1"/>
+              </a:solidFill>
+              <a:tailEnd type="triangle"/>
+            </a:ln>
+          </p:spPr>
+          <p:style>
+            <a:lnRef idx="1">
+              <a:schemeClr val="accent1"/>
+            </a:lnRef>
+            <a:fillRef idx="0">
+              <a:schemeClr val="accent1"/>
+            </a:fillRef>
+            <a:effectRef idx="0">
+              <a:schemeClr val="accent1"/>
+            </a:effectRef>
+            <a:fontRef idx="minor">
+              <a:schemeClr val="tx1"/>
+            </a:fontRef>
+          </p:style>
+        </p:cxnSp>
+        <p:sp>
+          <p:nvSpPr>
+            <p:cNvPr id="19" name="TextBox 18"/>
+            <p:cNvSpPr txBox="1"/>
+            <p:nvPr/>
+          </p:nvSpPr>
+          <p:spPr>
+            <a:xfrm>
+              <a:off x="6232233" y="2831674"/>
+              <a:ext cx="839525" cy="276999"/>
+            </a:xfrm>
+            <a:prstGeom prst="rect">
+              <a:avLst/>
+            </a:prstGeom>
+            <a:noFill/>
+          </p:spPr>
+          <p:txBody>
+            <a:bodyPr wrap="none" rtlCol="0">
+              <a:spAutoFit/>
+            </a:bodyPr>
+            <a:lstStyle/>
+            <a:p>
+              <a:r>
+                <a:rPr lang="en-US" sz="1200" b="1" dirty="0" err="1" smtClean="0">
+                  <a:solidFill>
+                    <a:schemeClr val="bg1"/>
+                  </a:solidFill>
+                </a:rPr>
+                <a:t>BiasZ</a:t>
+              </a:r>
+              <a:r>
+                <a:rPr lang="en-US" sz="1200" b="1" dirty="0" smtClean="0">
+                  <a:solidFill>
+                    <a:schemeClr val="bg1"/>
+                  </a:solidFill>
+                </a:rPr>
+                <a:t> coils</a:t>
+              </a:r>
+              <a:endParaRPr lang="en-US" sz="1200" b="1" dirty="0">
+                <a:solidFill>
+                  <a:schemeClr val="bg1"/>
+                </a:solidFill>
+              </a:endParaRPr>
+            </a:p>
+          </p:txBody>
+        </p:sp>
+        <p:cxnSp>
+          <p:nvCxnSpPr>
+            <p:cNvPr id="20" name="Straight Arrow Connector 19"/>
+            <p:cNvCxnSpPr/>
+            <p:nvPr/>
+          </p:nvCxnSpPr>
+          <p:spPr>
+            <a:xfrm flipH="1">
+              <a:off x="6585641" y="3098166"/>
+              <a:ext cx="66354" cy="138499"/>
+            </a:xfrm>
+            <a:prstGeom prst="straightConnector1">
+              <a:avLst/>
+            </a:prstGeom>
+            <a:ln w="28575">
+              <a:solidFill>
+                <a:schemeClr val="bg1"/>
+              </a:solidFill>
+              <a:tailEnd type="triangle"/>
+            </a:ln>
+          </p:spPr>
+          <p:style>
+            <a:lnRef idx="1">
+              <a:schemeClr val="accent1"/>
+            </a:lnRef>
+            <a:fillRef idx="0">
+              <a:schemeClr val="accent1"/>
+            </a:fillRef>
+            <a:effectRef idx="0">
+              <a:schemeClr val="accent1"/>
+            </a:effectRef>
+            <a:fontRef idx="minor">
+              <a:schemeClr val="tx1"/>
+            </a:fontRef>
+          </p:style>
+        </p:cxnSp>
+        <p:sp>
+          <p:nvSpPr>
+            <p:cNvPr id="22" name="TextBox 21"/>
+            <p:cNvSpPr txBox="1"/>
+            <p:nvPr/>
+          </p:nvSpPr>
+          <p:spPr>
+            <a:xfrm>
+              <a:off x="6165878" y="2512487"/>
+              <a:ext cx="803425" cy="276999"/>
+            </a:xfrm>
+            <a:prstGeom prst="rect">
+              <a:avLst/>
+            </a:prstGeom>
+            <a:noFill/>
+          </p:spPr>
+          <p:txBody>
+            <a:bodyPr wrap="none" rtlCol="0">
+              <a:spAutoFit/>
+            </a:bodyPr>
+            <a:lstStyle/>
+            <a:p>
+              <a:r>
+                <a:rPr lang="en-US" sz="1200" b="1" dirty="0" smtClean="0">
+                  <a:solidFill>
+                    <a:schemeClr val="bg1"/>
+                  </a:solidFill>
+                </a:rPr>
+                <a:t>Ion pump</a:t>
+              </a:r>
+              <a:endParaRPr lang="en-US" sz="1200" b="1" dirty="0">
+                <a:solidFill>
+                  <a:schemeClr val="bg1"/>
+                </a:solidFill>
+              </a:endParaRPr>
+            </a:p>
+          </p:txBody>
+        </p:sp>
+        <p:sp>
+          <p:nvSpPr>
+            <p:cNvPr id="23" name="TextBox 22"/>
+            <p:cNvSpPr txBox="1"/>
+            <p:nvPr/>
+          </p:nvSpPr>
+          <p:spPr>
+            <a:xfrm>
+              <a:off x="6969303" y="4480808"/>
+              <a:ext cx="580800" cy="276999"/>
+            </a:xfrm>
+            <a:prstGeom prst="rect">
+              <a:avLst/>
+            </a:prstGeom>
+            <a:noFill/>
+          </p:spPr>
+          <p:txBody>
+            <a:bodyPr wrap="none" rtlCol="0">
+              <a:spAutoFit/>
+            </a:bodyPr>
+            <a:lstStyle/>
+            <a:p>
+              <a:r>
+                <a:rPr lang="en-US" sz="1200" b="1" dirty="0" smtClean="0">
+                  <a:solidFill>
+                    <a:schemeClr val="bg1"/>
+                  </a:solidFill>
+                </a:rPr>
+                <a:t>Ovens</a:t>
+              </a:r>
+              <a:endParaRPr lang="en-US" sz="1200" b="1" dirty="0">
+                <a:solidFill>
+                  <a:schemeClr val="bg1"/>
+                </a:solidFill>
+              </a:endParaRPr>
+            </a:p>
+          </p:txBody>
+        </p:sp>
+        <p:sp>
+          <p:nvSpPr>
+            <p:cNvPr id="24" name="TextBox 23"/>
+            <p:cNvSpPr txBox="1"/>
+            <p:nvPr/>
+          </p:nvSpPr>
+          <p:spPr>
+            <a:xfrm>
+              <a:off x="7701190" y="3460254"/>
+              <a:ext cx="889987" cy="461665"/>
+            </a:xfrm>
+            <a:prstGeom prst="rect">
+              <a:avLst/>
+            </a:prstGeom>
+            <a:noFill/>
+          </p:spPr>
+          <p:txBody>
+            <a:bodyPr wrap="none" rtlCol="0">
+              <a:spAutoFit/>
+            </a:bodyPr>
+            <a:lstStyle/>
+            <a:p>
+              <a:r>
+                <a:rPr lang="en-US" sz="1200" b="1" dirty="0" smtClean="0">
+                  <a:solidFill>
+                    <a:schemeClr val="bg1"/>
+                  </a:solidFill>
+                </a:rPr>
+                <a:t>Push beam</a:t>
+              </a:r>
+            </a:p>
+            <a:p>
+              <a:r>
+                <a:rPr lang="en-US" sz="1200" b="1" dirty="0" smtClean="0">
+                  <a:solidFill>
+                    <a:schemeClr val="bg1"/>
+                  </a:solidFill>
+                </a:rPr>
+                <a:t>optics</a:t>
+              </a:r>
+              <a:endParaRPr lang="en-US" sz="1200" b="1" dirty="0">
+                <a:solidFill>
+                  <a:schemeClr val="bg1"/>
+                </a:solidFill>
+              </a:endParaRPr>
+            </a:p>
+          </p:txBody>
+        </p:sp>
+        <p:sp>
+          <p:nvSpPr>
+            <p:cNvPr id="25" name="TextBox 24"/>
+            <p:cNvSpPr txBox="1"/>
+            <p:nvPr/>
+          </p:nvSpPr>
+          <p:spPr>
+            <a:xfrm>
+              <a:off x="3922807" y="4342308"/>
+              <a:ext cx="1035283" cy="276999"/>
+            </a:xfrm>
+            <a:prstGeom prst="rect">
+              <a:avLst/>
+            </a:prstGeom>
+            <a:noFill/>
+          </p:spPr>
+          <p:txBody>
+            <a:bodyPr wrap="none" rtlCol="0">
+              <a:spAutoFit/>
+            </a:bodyPr>
+            <a:lstStyle/>
+            <a:p>
+              <a:r>
+                <a:rPr lang="en-US" sz="1200" b="1" dirty="0" smtClean="0">
+                  <a:solidFill>
+                    <a:schemeClr val="bg1"/>
+                  </a:solidFill>
+                </a:rPr>
+                <a:t>Test chamber</a:t>
+              </a:r>
+              <a:endParaRPr lang="en-US" sz="1200" b="1" dirty="0">
+                <a:solidFill>
+                  <a:schemeClr val="bg1"/>
+                </a:solidFill>
+              </a:endParaRPr>
+            </a:p>
+          </p:txBody>
+        </p:sp>
+        <p:cxnSp>
+          <p:nvCxnSpPr>
+            <p:cNvPr id="26" name="Straight Arrow Connector 25"/>
+            <p:cNvCxnSpPr/>
+            <p:nvPr/>
+          </p:nvCxnSpPr>
+          <p:spPr>
+            <a:xfrm flipH="1" flipV="1">
+              <a:off x="4099538" y="4145508"/>
+              <a:ext cx="169808" cy="284824"/>
+            </a:xfrm>
+            <a:prstGeom prst="straightConnector1">
+              <a:avLst/>
+            </a:prstGeom>
+            <a:ln w="28575">
+              <a:solidFill>
+                <a:schemeClr val="bg1"/>
+              </a:solidFill>
+              <a:tailEnd type="triangle"/>
+            </a:ln>
+          </p:spPr>
+          <p:style>
+            <a:lnRef idx="1">
+              <a:schemeClr val="accent1"/>
+            </a:lnRef>
+            <a:fillRef idx="0">
+              <a:schemeClr val="accent1"/>
+            </a:fillRef>
+            <a:effectRef idx="0">
+              <a:schemeClr val="accent1"/>
+            </a:effectRef>
+            <a:fontRef idx="minor">
+              <a:schemeClr val="tx1"/>
+            </a:fontRef>
+          </p:style>
+        </p:cxnSp>
+        <p:cxnSp>
+          <p:nvCxnSpPr>
+            <p:cNvPr id="28" name="Straight Arrow Connector 27"/>
+            <p:cNvCxnSpPr/>
+            <p:nvPr/>
+          </p:nvCxnSpPr>
+          <p:spPr>
+            <a:xfrm>
+              <a:off x="5806059" y="3411120"/>
+              <a:ext cx="86026" cy="279966"/>
+            </a:xfrm>
+            <a:prstGeom prst="straightConnector1">
+              <a:avLst/>
+            </a:prstGeom>
+            <a:ln w="28575">
+              <a:solidFill>
+                <a:schemeClr val="bg1"/>
+              </a:solidFill>
+              <a:tailEnd type="triangle"/>
+            </a:ln>
+          </p:spPr>
+          <p:style>
+            <a:lnRef idx="1">
+              <a:schemeClr val="accent1"/>
+            </a:lnRef>
+            <a:fillRef idx="0">
+              <a:schemeClr val="accent1"/>
+            </a:fillRef>
+            <a:effectRef idx="0">
+              <a:schemeClr val="accent1"/>
+            </a:effectRef>
+            <a:fontRef idx="minor">
+              <a:schemeClr val="tx1"/>
+            </a:fontRef>
+          </p:style>
+        </p:cxnSp>
+        <p:cxnSp>
+          <p:nvCxnSpPr>
+            <p:cNvPr id="30" name="Straight Arrow Connector 29"/>
+            <p:cNvCxnSpPr>
+              <a:stCxn id="19" idx="2"/>
+            </p:cNvCxnSpPr>
+            <p:nvPr/>
+          </p:nvCxnSpPr>
+          <p:spPr>
+            <a:xfrm flipH="1">
+              <a:off x="5460642" y="3108673"/>
+              <a:ext cx="1191354" cy="351581"/>
+            </a:xfrm>
+            <a:prstGeom prst="straightConnector1">
+              <a:avLst/>
+            </a:prstGeom>
+            <a:ln w="28575">
+              <a:solidFill>
+                <a:schemeClr val="bg1"/>
+              </a:solidFill>
+              <a:tailEnd type="triangle"/>
+            </a:ln>
+          </p:spPr>
+          <p:style>
+            <a:lnRef idx="1">
+              <a:schemeClr val="accent1"/>
+            </a:lnRef>
+            <a:fillRef idx="0">
+              <a:schemeClr val="accent1"/>
+            </a:fillRef>
+            <a:effectRef idx="0">
+              <a:schemeClr val="accent1"/>
+            </a:effectRef>
+            <a:fontRef idx="minor">
+              <a:schemeClr val="tx1"/>
+            </a:fontRef>
+          </p:style>
+        </p:cxnSp>
+        <p:cxnSp>
+          <p:nvCxnSpPr>
+            <p:cNvPr id="33" name="Straight Arrow Connector 32"/>
+            <p:cNvCxnSpPr>
+              <a:stCxn id="23" idx="0"/>
+            </p:cNvCxnSpPr>
+            <p:nvPr/>
+          </p:nvCxnSpPr>
+          <p:spPr>
+            <a:xfrm flipH="1" flipV="1">
+              <a:off x="6969303" y="4430333"/>
+              <a:ext cx="290400" cy="50475"/>
+            </a:xfrm>
+            <a:prstGeom prst="straightConnector1">
+              <a:avLst/>
+            </a:prstGeom>
+            <a:ln w="28575">
+              <a:solidFill>
+                <a:schemeClr val="bg1"/>
+              </a:solidFill>
+              <a:tailEnd type="triangle"/>
+            </a:ln>
+          </p:spPr>
+          <p:style>
+            <a:lnRef idx="1">
+              <a:schemeClr val="accent1"/>
+            </a:lnRef>
+            <a:fillRef idx="0">
+              <a:schemeClr val="accent1"/>
+            </a:fillRef>
+            <a:effectRef idx="0">
+              <a:schemeClr val="accent1"/>
+            </a:effectRef>
+            <a:fontRef idx="minor">
+              <a:schemeClr val="tx1"/>
+            </a:fontRef>
+          </p:style>
+        </p:cxnSp>
+        <p:cxnSp>
+          <p:nvCxnSpPr>
+            <p:cNvPr id="35" name="Straight Arrow Connector 34"/>
+            <p:cNvCxnSpPr>
+              <a:stCxn id="23" idx="0"/>
+            </p:cNvCxnSpPr>
+            <p:nvPr/>
+          </p:nvCxnSpPr>
+          <p:spPr>
+            <a:xfrm flipH="1" flipV="1">
+              <a:off x="6732755" y="4037528"/>
+              <a:ext cx="526948" cy="443280"/>
+            </a:xfrm>
+            <a:prstGeom prst="straightConnector1">
+              <a:avLst/>
+            </a:prstGeom>
+            <a:ln w="28575">
+              <a:solidFill>
+                <a:schemeClr val="bg1"/>
+              </a:solidFill>
+              <a:tailEnd type="triangle"/>
+            </a:ln>
+          </p:spPr>
+          <p:style>
+            <a:lnRef idx="1">
+              <a:schemeClr val="accent1"/>
+            </a:lnRef>
+            <a:fillRef idx="0">
+              <a:schemeClr val="accent1"/>
+            </a:fillRef>
+            <a:effectRef idx="0">
+              <a:schemeClr val="accent1"/>
+            </a:effectRef>
+            <a:fontRef idx="minor">
+              <a:schemeClr val="tx1"/>
+            </a:fontRef>
+          </p:style>
+        </p:cxnSp>
+        <p:sp>
+          <p:nvSpPr>
+            <p:cNvPr id="38" name="TextBox 37"/>
+            <p:cNvSpPr txBox="1"/>
+            <p:nvPr/>
+          </p:nvSpPr>
+          <p:spPr>
+            <a:xfrm>
+              <a:off x="4995868" y="4475948"/>
+              <a:ext cx="442750" cy="276999"/>
+            </a:xfrm>
+            <a:prstGeom prst="rect">
+              <a:avLst/>
+            </a:prstGeom>
+            <a:noFill/>
+          </p:spPr>
+          <p:txBody>
+            <a:bodyPr wrap="none" rtlCol="0">
+              <a:spAutoFit/>
+            </a:bodyPr>
+            <a:lstStyle/>
+            <a:p>
+              <a:r>
+                <a:rPr lang="en-US" sz="1200" b="1" dirty="0" smtClean="0">
+                  <a:solidFill>
+                    <a:schemeClr val="bg1"/>
+                  </a:solidFill>
+                </a:rPr>
+                <a:t>Flag</a:t>
+              </a:r>
+              <a:endParaRPr lang="en-US" sz="1200" b="1" dirty="0">
+                <a:solidFill>
+                  <a:schemeClr val="bg1"/>
+                </a:solidFill>
+              </a:endParaRPr>
+            </a:p>
+          </p:txBody>
+        </p:sp>
+        <p:sp>
+          <p:nvSpPr>
+            <p:cNvPr id="39" name="TextBox 38"/>
+            <p:cNvSpPr txBox="1"/>
+            <p:nvPr/>
+          </p:nvSpPr>
+          <p:spPr>
+            <a:xfrm>
+              <a:off x="4366241" y="3939157"/>
+              <a:ext cx="851002" cy="276999"/>
+            </a:xfrm>
+            <a:prstGeom prst="rect">
+              <a:avLst/>
+            </a:prstGeom>
+            <a:noFill/>
+          </p:spPr>
+          <p:txBody>
+            <a:bodyPr wrap="none" rtlCol="0">
+              <a:spAutoFit/>
+            </a:bodyPr>
+            <a:lstStyle/>
+            <a:p>
+              <a:r>
+                <a:rPr lang="en-US" sz="1200" b="1" dirty="0" smtClean="0">
+                  <a:solidFill>
+                    <a:schemeClr val="bg1"/>
+                  </a:solidFill>
+                </a:rPr>
+                <a:t>Gate valve</a:t>
+              </a:r>
+              <a:endParaRPr lang="en-US" sz="1200" b="1" dirty="0">
+                <a:solidFill>
+                  <a:schemeClr val="bg1"/>
+                </a:solidFill>
+              </a:endParaRPr>
+            </a:p>
+          </p:txBody>
+        </p:sp>
+        <p:cxnSp>
+          <p:nvCxnSpPr>
+            <p:cNvPr id="40" name="Straight Arrow Connector 39"/>
+            <p:cNvCxnSpPr>
+              <a:stCxn id="38" idx="0"/>
+            </p:cNvCxnSpPr>
+            <p:nvPr/>
+          </p:nvCxnSpPr>
+          <p:spPr>
+            <a:xfrm flipV="1">
+              <a:off x="5217243" y="4287920"/>
+              <a:ext cx="37778" cy="188028"/>
+            </a:xfrm>
+            <a:prstGeom prst="straightConnector1">
+              <a:avLst/>
+            </a:prstGeom>
+            <a:ln w="28575">
+              <a:solidFill>
+                <a:schemeClr val="bg1"/>
+              </a:solidFill>
+              <a:tailEnd type="triangle"/>
+            </a:ln>
+          </p:spPr>
+          <p:style>
+            <a:lnRef idx="1">
+              <a:schemeClr val="accent1"/>
+            </a:lnRef>
+            <a:fillRef idx="0">
+              <a:schemeClr val="accent1"/>
+            </a:fillRef>
+            <a:effectRef idx="0">
+              <a:schemeClr val="accent1"/>
+            </a:effectRef>
+            <a:fontRef idx="minor">
+              <a:schemeClr val="tx1"/>
+            </a:fontRef>
+          </p:style>
+        </p:cxnSp>
+        <p:cxnSp>
+          <p:nvCxnSpPr>
+            <p:cNvPr id="44" name="Straight Arrow Connector 43"/>
+            <p:cNvCxnSpPr/>
+            <p:nvPr/>
+          </p:nvCxnSpPr>
+          <p:spPr>
+            <a:xfrm flipV="1">
+              <a:off x="4559402" y="3598754"/>
+              <a:ext cx="284139" cy="434301"/>
+            </a:xfrm>
+            <a:prstGeom prst="straightConnector1">
+              <a:avLst/>
+            </a:prstGeom>
+            <a:ln w="28575">
+              <a:solidFill>
+                <a:schemeClr val="bg1"/>
+              </a:solidFill>
+              <a:tailEnd type="triangle"/>
+            </a:ln>
+          </p:spPr>
+          <p:style>
+            <a:lnRef idx="1">
+              <a:schemeClr val="accent1"/>
+            </a:lnRef>
+            <a:fillRef idx="0">
+              <a:schemeClr val="accent1"/>
+            </a:fillRef>
+            <a:effectRef idx="0">
+              <a:schemeClr val="accent1"/>
+            </a:effectRef>
+            <a:fontRef idx="minor">
+              <a:schemeClr val="tx1"/>
+            </a:fontRef>
+          </p:style>
+        </p:cxnSp>
+        <p:sp>
+          <p:nvSpPr>
+            <p:cNvPr id="50" name="TextBox 49"/>
+            <p:cNvSpPr txBox="1"/>
+            <p:nvPr/>
+          </p:nvSpPr>
+          <p:spPr>
+            <a:xfrm>
+              <a:off x="5549161" y="4522114"/>
+              <a:ext cx="801758" cy="461665"/>
+            </a:xfrm>
+            <a:prstGeom prst="rect">
+              <a:avLst/>
+            </a:prstGeom>
+            <a:noFill/>
+          </p:spPr>
+          <p:txBody>
+            <a:bodyPr wrap="none" rtlCol="0">
+              <a:spAutoFit/>
+            </a:bodyPr>
+            <a:lstStyle/>
+            <a:p>
+              <a:r>
+                <a:rPr lang="en-US" sz="1200" b="1" dirty="0" smtClean="0">
+                  <a:solidFill>
+                    <a:schemeClr val="bg1"/>
+                  </a:solidFill>
+                </a:rPr>
+                <a:t>Periscope</a:t>
+              </a:r>
+            </a:p>
+            <a:p>
+              <a:r>
+                <a:rPr lang="en-US" sz="1200" b="1" dirty="0" smtClean="0">
+                  <a:solidFill>
+                    <a:schemeClr val="bg1"/>
+                  </a:solidFill>
+                </a:rPr>
+                <a:t>mirror</a:t>
+              </a:r>
+              <a:endParaRPr lang="en-US" sz="1200" b="1" dirty="0">
+                <a:solidFill>
+                  <a:schemeClr val="bg1"/>
+                </a:solidFill>
+              </a:endParaRPr>
+            </a:p>
+          </p:txBody>
+        </p:sp>
+        <p:sp>
+          <p:nvSpPr>
+            <p:cNvPr id="51" name="TextBox 50"/>
+            <p:cNvSpPr txBox="1"/>
+            <p:nvPr/>
+          </p:nvSpPr>
+          <p:spPr>
+            <a:xfrm>
+              <a:off x="6567590" y="3334713"/>
+              <a:ext cx="1194558" cy="461665"/>
+            </a:xfrm>
+            <a:prstGeom prst="rect">
+              <a:avLst/>
+            </a:prstGeom>
+            <a:noFill/>
+          </p:spPr>
+          <p:txBody>
+            <a:bodyPr wrap="none" rtlCol="0">
+              <a:spAutoFit/>
+            </a:bodyPr>
+            <a:lstStyle/>
+            <a:p>
+              <a:r>
+                <a:rPr lang="en-US" sz="1200" b="1" dirty="0" smtClean="0">
+                  <a:solidFill>
+                    <a:schemeClr val="bg1"/>
+                  </a:solidFill>
+                </a:rPr>
+                <a:t>Retro-reflection</a:t>
+              </a:r>
+            </a:p>
+            <a:p>
+              <a:r>
+                <a:rPr lang="en-US" sz="1200" b="1" dirty="0" smtClean="0">
+                  <a:solidFill>
+                    <a:schemeClr val="bg1"/>
+                  </a:solidFill>
+                </a:rPr>
+                <a:t>mirrors</a:t>
+              </a:r>
+              <a:endParaRPr lang="en-US" sz="1200" b="1" dirty="0">
+                <a:solidFill>
+                  <a:schemeClr val="bg1"/>
+                </a:solidFill>
+              </a:endParaRPr>
+            </a:p>
+          </p:txBody>
+        </p:sp>
+        <p:cxnSp>
+          <p:nvCxnSpPr>
+            <p:cNvPr id="52" name="Straight Arrow Connector 51"/>
+            <p:cNvCxnSpPr/>
+            <p:nvPr/>
+          </p:nvCxnSpPr>
+          <p:spPr>
+            <a:xfrm flipH="1" flipV="1">
+              <a:off x="5743741" y="4430333"/>
+              <a:ext cx="148344" cy="184114"/>
+            </a:xfrm>
+            <a:prstGeom prst="straightConnector1">
+              <a:avLst/>
+            </a:prstGeom>
+            <a:ln w="28575">
+              <a:solidFill>
+                <a:schemeClr val="bg1"/>
+              </a:solidFill>
+              <a:tailEnd type="triangle"/>
+            </a:ln>
+          </p:spPr>
+          <p:style>
+            <a:lnRef idx="1">
+              <a:schemeClr val="accent1"/>
+            </a:lnRef>
+            <a:fillRef idx="0">
+              <a:schemeClr val="accent1"/>
+            </a:fillRef>
+            <a:effectRef idx="0">
+              <a:schemeClr val="accent1"/>
+            </a:effectRef>
+            <a:fontRef idx="minor">
+              <a:schemeClr val="tx1"/>
+            </a:fontRef>
+          </p:style>
+        </p:cxnSp>
+        <p:cxnSp>
+          <p:nvCxnSpPr>
+            <p:cNvPr id="55" name="Straight Arrow Connector 54"/>
+            <p:cNvCxnSpPr/>
+            <p:nvPr/>
+          </p:nvCxnSpPr>
+          <p:spPr>
+            <a:xfrm flipH="1" flipV="1">
+              <a:off x="6044086" y="3578410"/>
+              <a:ext cx="617100" cy="13296"/>
+            </a:xfrm>
+            <a:prstGeom prst="straightConnector1">
+              <a:avLst/>
+            </a:prstGeom>
+            <a:ln w="28575">
+              <a:solidFill>
+                <a:schemeClr val="bg1"/>
+              </a:solidFill>
+              <a:tailEnd type="triangle"/>
+            </a:ln>
+          </p:spPr>
+          <p:style>
+            <a:lnRef idx="1">
+              <a:schemeClr val="accent1"/>
+            </a:lnRef>
+            <a:fillRef idx="0">
+              <a:schemeClr val="accent1"/>
+            </a:fillRef>
+            <a:effectRef idx="0">
+              <a:schemeClr val="accent1"/>
+            </a:effectRef>
+            <a:fontRef idx="minor">
+              <a:schemeClr val="tx1"/>
+            </a:fontRef>
+          </p:style>
+        </p:cxnSp>
+        <p:cxnSp>
+          <p:nvCxnSpPr>
+            <p:cNvPr id="58" name="Straight Arrow Connector 57"/>
+            <p:cNvCxnSpPr/>
+            <p:nvPr/>
+          </p:nvCxnSpPr>
+          <p:spPr>
+            <a:xfrm flipH="1">
+              <a:off x="6328374" y="3596390"/>
+              <a:ext cx="323622" cy="355917"/>
+            </a:xfrm>
+            <a:prstGeom prst="straightConnector1">
+              <a:avLst/>
+            </a:prstGeom>
+            <a:ln w="28575">
+              <a:solidFill>
+                <a:schemeClr val="bg1"/>
+              </a:solidFill>
+              <a:tailEnd type="triangle"/>
+            </a:ln>
+          </p:spPr>
+          <p:style>
+            <a:lnRef idx="1">
+              <a:schemeClr val="accent1"/>
+            </a:lnRef>
+            <a:fillRef idx="0">
+              <a:schemeClr val="accent1"/>
+            </a:fillRef>
+            <a:effectRef idx="0">
+              <a:schemeClr val="accent1"/>
+            </a:effectRef>
+            <a:fontRef idx="minor">
+              <a:schemeClr val="tx1"/>
+            </a:fontRef>
+          </p:style>
+        </p:cxnSp>
+      </p:grpSp>
+    </p:spTree>
+    <p:extLst>
+      <p:ext uri="{BB962C8B-B14F-4D97-AF65-F5344CB8AC3E}">
+        <p14:creationId xmlns:p14="http://schemas.microsoft.com/office/powerpoint/2010/main" val="2700186847"/>
       </p:ext>
     </p:extLst>
   </p:cSld>

</xml_diff>

<commit_message>
Went through Ana's comments on absorption imaging chapter, and Kristen and Jon's comments on synthetic dimensions chapter. Also adding a couple python scripts that forgot to add to versioning for bloch osc chapter.
</commit_message>
<xml_diff>
--- a/BEC_DFG figures/2D MOT pictures.pptx
+++ b/BEC_DFG figures/2D MOT pictures.pptx
@@ -247,7 +247,7 @@
           <a:p>
             <a:fld id="{B76106A0-2D27-4EED-8823-794999301753}" type="datetimeFigureOut">
               <a:rPr lang="en-US" smtClean="0"/>
-              <a:t>12/19/2018</a:t>
+              <a:t>1/22/2019</a:t>
             </a:fld>
             <a:endParaRPr lang="en-US"/>
           </a:p>
@@ -417,7 +417,7 @@
           <a:p>
             <a:fld id="{B76106A0-2D27-4EED-8823-794999301753}" type="datetimeFigureOut">
               <a:rPr lang="en-US" smtClean="0"/>
-              <a:t>12/19/2018</a:t>
+              <a:t>1/22/2019</a:t>
             </a:fld>
             <a:endParaRPr lang="en-US"/>
           </a:p>
@@ -597,7 +597,7 @@
           <a:p>
             <a:fld id="{B76106A0-2D27-4EED-8823-794999301753}" type="datetimeFigureOut">
               <a:rPr lang="en-US" smtClean="0"/>
-              <a:t>12/19/2018</a:t>
+              <a:t>1/22/2019</a:t>
             </a:fld>
             <a:endParaRPr lang="en-US"/>
           </a:p>
@@ -767,7 +767,7 @@
           <a:p>
             <a:fld id="{B76106A0-2D27-4EED-8823-794999301753}" type="datetimeFigureOut">
               <a:rPr lang="en-US" smtClean="0"/>
-              <a:t>12/19/2018</a:t>
+              <a:t>1/22/2019</a:t>
             </a:fld>
             <a:endParaRPr lang="en-US"/>
           </a:p>
@@ -1013,7 +1013,7 @@
           <a:p>
             <a:fld id="{B76106A0-2D27-4EED-8823-794999301753}" type="datetimeFigureOut">
               <a:rPr lang="en-US" smtClean="0"/>
-              <a:t>12/19/2018</a:t>
+              <a:t>1/22/2019</a:t>
             </a:fld>
             <a:endParaRPr lang="en-US"/>
           </a:p>
@@ -1245,7 +1245,7 @@
           <a:p>
             <a:fld id="{B76106A0-2D27-4EED-8823-794999301753}" type="datetimeFigureOut">
               <a:rPr lang="en-US" smtClean="0"/>
-              <a:t>12/19/2018</a:t>
+              <a:t>1/22/2019</a:t>
             </a:fld>
             <a:endParaRPr lang="en-US"/>
           </a:p>
@@ -1612,7 +1612,7 @@
           <a:p>
             <a:fld id="{B76106A0-2D27-4EED-8823-794999301753}" type="datetimeFigureOut">
               <a:rPr lang="en-US" smtClean="0"/>
-              <a:t>12/19/2018</a:t>
+              <a:t>1/22/2019</a:t>
             </a:fld>
             <a:endParaRPr lang="en-US"/>
           </a:p>
@@ -1730,7 +1730,7 @@
           <a:p>
             <a:fld id="{B76106A0-2D27-4EED-8823-794999301753}" type="datetimeFigureOut">
               <a:rPr lang="en-US" smtClean="0"/>
-              <a:t>12/19/2018</a:t>
+              <a:t>1/22/2019</a:t>
             </a:fld>
             <a:endParaRPr lang="en-US"/>
           </a:p>
@@ -1825,7 +1825,7 @@
           <a:p>
             <a:fld id="{B76106A0-2D27-4EED-8823-794999301753}" type="datetimeFigureOut">
               <a:rPr lang="en-US" smtClean="0"/>
-              <a:t>12/19/2018</a:t>
+              <a:t>1/22/2019</a:t>
             </a:fld>
             <a:endParaRPr lang="en-US"/>
           </a:p>
@@ -2102,7 +2102,7 @@
           <a:p>
             <a:fld id="{B76106A0-2D27-4EED-8823-794999301753}" type="datetimeFigureOut">
               <a:rPr lang="en-US" smtClean="0"/>
-              <a:t>12/19/2018</a:t>
+              <a:t>1/22/2019</a:t>
             </a:fld>
             <a:endParaRPr lang="en-US"/>
           </a:p>
@@ -2355,7 +2355,7 @@
           <a:p>
             <a:fld id="{B76106A0-2D27-4EED-8823-794999301753}" type="datetimeFigureOut">
               <a:rPr lang="en-US" smtClean="0"/>
-              <a:t>12/19/2018</a:t>
+              <a:t>1/22/2019</a:t>
             </a:fld>
             <a:endParaRPr lang="en-US"/>
           </a:p>
@@ -2568,7 +2568,7 @@
           <a:p>
             <a:fld id="{B76106A0-2D27-4EED-8823-794999301753}" type="datetimeFigureOut">
               <a:rPr lang="en-US" smtClean="0"/>
-              <a:t>12/19/2018</a:t>
+              <a:t>1/22/2019</a:t>
             </a:fld>
             <a:endParaRPr lang="en-US"/>
           </a:p>
@@ -2975,426 +2975,489 @@
       </p:grpSpPr>
       <p:grpSp>
         <p:nvGrpSpPr>
-          <p:cNvPr id="22" name="Group 21"/>
+          <p:cNvPr id="3" name="Group 2"/>
           <p:cNvGrpSpPr/>
           <p:nvPr/>
         </p:nvGrpSpPr>
         <p:grpSpPr>
           <a:xfrm>
-            <a:off x="4463094" y="651788"/>
-            <a:ext cx="5844001" cy="4572001"/>
-            <a:chOff x="4463094" y="651788"/>
-            <a:chExt cx="5844001" cy="4572001"/>
+            <a:off x="4213654" y="395416"/>
+            <a:ext cx="6227805" cy="5004487"/>
+            <a:chOff x="4213654" y="395416"/>
+            <a:chExt cx="6227805" cy="5004487"/>
           </a:xfrm>
         </p:grpSpPr>
-        <p:pic>
-          <p:nvPicPr>
-            <p:cNvPr id="4" name="Picture 3"/>
-            <p:cNvPicPr>
-              <a:picLocks noChangeAspect="1"/>
-            </p:cNvPicPr>
+        <p:sp>
+          <p:nvSpPr>
+            <p:cNvPr id="2" name="Rectangle 1"/>
+            <p:cNvSpPr/>
             <p:nvPr/>
-          </p:nvPicPr>
-          <p:blipFill rotWithShape="1">
-            <a:blip r:embed="rId2">
-              <a:extLst>
-                <a:ext uri="{28A0092B-C50C-407E-A947-70E740481C1C}">
-                  <a14:useLocalDpi xmlns:a14="http://schemas.microsoft.com/office/drawing/2010/main" val="0"/>
-                </a:ext>
-              </a:extLst>
-            </a:blip>
-            <a:srcRect l="56091" t="4313" r="15387" b="50253"/>
-            <a:stretch/>
-          </p:blipFill>
+          </p:nvSpPr>
           <p:spPr>
             <a:xfrm>
-              <a:off x="4820695" y="651788"/>
-              <a:ext cx="5486400" cy="4572001"/>
+              <a:off x="4213654" y="395416"/>
+              <a:ext cx="6227805" cy="5004487"/>
             </a:xfrm>
             <a:prstGeom prst="rect">
               <a:avLst/>
             </a:prstGeom>
+            <a:solidFill>
+              <a:schemeClr val="bg1"/>
+            </a:solidFill>
+            <a:ln>
+              <a:solidFill>
+                <a:schemeClr val="bg1"/>
+              </a:solidFill>
+            </a:ln>
           </p:spPr>
-        </p:pic>
-        <p:sp>
-          <p:nvSpPr>
-            <p:cNvPr id="5" name="TextBox 4"/>
-            <p:cNvSpPr txBox="1"/>
-            <p:nvPr/>
-          </p:nvSpPr>
-          <p:spPr>
-            <a:xfrm rot="1842234">
-              <a:off x="9235858" y="4553401"/>
-              <a:ext cx="923523" cy="276999"/>
-            </a:xfrm>
-            <a:prstGeom prst="rect">
-              <a:avLst/>
-            </a:prstGeom>
-            <a:noFill/>
-          </p:spPr>
+          <p:style>
+            <a:lnRef idx="2">
+              <a:schemeClr val="accent1">
+                <a:shade val="50000"/>
+              </a:schemeClr>
+            </a:lnRef>
+            <a:fillRef idx="1">
+              <a:schemeClr val="accent1"/>
+            </a:fillRef>
+            <a:effectRef idx="0">
+              <a:schemeClr val="accent1"/>
+            </a:effectRef>
+            <a:fontRef idx="minor">
+              <a:schemeClr val="lt1"/>
+            </a:fontRef>
+          </p:style>
           <p:txBody>
-            <a:bodyPr wrap="none" rtlCol="0">
-              <a:spAutoFit/>
-            </a:bodyPr>
+            <a:bodyPr rtlCol="0" anchor="ctr"/>
             <a:lstStyle/>
             <a:p>
-              <a:r>
-                <a:rPr lang="en-US" sz="1200" dirty="0" smtClean="0"/>
-                <a:t>To 3-D MOT</a:t>
-              </a:r>
-              <a:endParaRPr lang="en-US" sz="1200" dirty="0"/>
+              <a:pPr algn="ctr"/>
+              <a:endParaRPr lang="en-US"/>
             </a:p>
           </p:txBody>
         </p:sp>
-        <p:sp>
-          <p:nvSpPr>
-            <p:cNvPr id="6" name="TextBox 5"/>
-            <p:cNvSpPr txBox="1"/>
+        <p:grpSp>
+          <p:nvGrpSpPr>
+            <p:cNvPr id="22" name="Group 21"/>
+            <p:cNvGrpSpPr/>
             <p:nvPr/>
-          </p:nvSpPr>
-          <p:spPr>
+          </p:nvGrpSpPr>
+          <p:grpSpPr>
             <a:xfrm>
-              <a:off x="8266386" y="4901493"/>
-              <a:ext cx="1046825" cy="276999"/>
+              <a:off x="4463094" y="651788"/>
+              <a:ext cx="5844001" cy="4572001"/>
+              <a:chOff x="4463094" y="651788"/>
+              <a:chExt cx="5844001" cy="4572001"/>
             </a:xfrm>
-            <a:prstGeom prst="rect">
-              <a:avLst/>
-            </a:prstGeom>
-            <a:noFill/>
-          </p:spPr>
-          <p:txBody>
-            <a:bodyPr wrap="none" rtlCol="0">
-              <a:spAutoFit/>
-            </a:bodyPr>
-            <a:lstStyle/>
-            <a:p>
-              <a:r>
-                <a:rPr lang="en-US" sz="1200" dirty="0" smtClean="0"/>
-                <a:t>Rotatable flag</a:t>
-              </a:r>
-              <a:endParaRPr lang="en-US" sz="1200" dirty="0"/>
-            </a:p>
-          </p:txBody>
-        </p:sp>
-        <p:sp>
-          <p:nvSpPr>
-            <p:cNvPr id="7" name="TextBox 6"/>
-            <p:cNvSpPr txBox="1"/>
-            <p:nvPr/>
-          </p:nvSpPr>
-          <p:spPr>
-            <a:xfrm>
-              <a:off x="8902955" y="2278805"/>
-              <a:ext cx="836704" cy="276999"/>
-            </a:xfrm>
-            <a:prstGeom prst="rect">
-              <a:avLst/>
-            </a:prstGeom>
-            <a:noFill/>
-          </p:spPr>
-          <p:txBody>
-            <a:bodyPr wrap="none" rtlCol="0">
-              <a:spAutoFit/>
-            </a:bodyPr>
-            <a:lstStyle/>
-            <a:p>
-              <a:r>
-                <a:rPr lang="en-US" sz="1200" dirty="0" smtClean="0"/>
-                <a:t>Gate valve</a:t>
-              </a:r>
-              <a:endParaRPr lang="en-US" sz="1200" dirty="0"/>
-            </a:p>
-          </p:txBody>
-        </p:sp>
-        <p:sp>
-          <p:nvSpPr>
-            <p:cNvPr id="8" name="TextBox 7"/>
-            <p:cNvSpPr txBox="1"/>
-            <p:nvPr/>
-          </p:nvSpPr>
-          <p:spPr>
-            <a:xfrm rot="17022770">
-              <a:off x="4724198" y="2948151"/>
-              <a:ext cx="605679" cy="276999"/>
-            </a:xfrm>
-            <a:prstGeom prst="rect">
-              <a:avLst/>
-            </a:prstGeom>
-            <a:noFill/>
-          </p:spPr>
-          <p:txBody>
-            <a:bodyPr wrap="none" rtlCol="0">
-              <a:spAutoFit/>
-            </a:bodyPr>
-            <a:lstStyle/>
-            <a:p>
-              <a:r>
-                <a:rPr lang="en-US" sz="1200" dirty="0" smtClean="0"/>
-                <a:t>K oven</a:t>
-              </a:r>
-              <a:endParaRPr lang="en-US" sz="1200" dirty="0"/>
-            </a:p>
-          </p:txBody>
-        </p:sp>
-        <p:sp>
-          <p:nvSpPr>
-            <p:cNvPr id="9" name="TextBox 8"/>
-            <p:cNvSpPr txBox="1"/>
-            <p:nvPr/>
-          </p:nvSpPr>
-          <p:spPr>
-            <a:xfrm>
-              <a:off x="5454868" y="1008992"/>
-              <a:ext cx="689035" cy="276999"/>
-            </a:xfrm>
-            <a:prstGeom prst="rect">
-              <a:avLst/>
-            </a:prstGeom>
-            <a:noFill/>
-          </p:spPr>
-          <p:txBody>
-            <a:bodyPr wrap="none" rtlCol="0">
-              <a:spAutoFit/>
-            </a:bodyPr>
-            <a:lstStyle/>
-            <a:p>
-              <a:r>
-                <a:rPr lang="en-US" sz="1200" dirty="0" err="1" smtClean="0"/>
-                <a:t>Rb</a:t>
-              </a:r>
-              <a:r>
-                <a:rPr lang="en-US" sz="1200" dirty="0" smtClean="0"/>
-                <a:t> oven</a:t>
-              </a:r>
-              <a:endParaRPr lang="en-US" sz="1200" dirty="0"/>
-            </a:p>
-          </p:txBody>
-        </p:sp>
-        <p:sp>
-          <p:nvSpPr>
-            <p:cNvPr id="10" name="TextBox 9"/>
-            <p:cNvSpPr txBox="1"/>
-            <p:nvPr/>
-          </p:nvSpPr>
-          <p:spPr>
-            <a:xfrm>
-              <a:off x="7874291" y="1343197"/>
-              <a:ext cx="784189" cy="276999"/>
-            </a:xfrm>
-            <a:prstGeom prst="rect">
-              <a:avLst/>
-            </a:prstGeom>
-            <a:noFill/>
-          </p:spPr>
-          <p:txBody>
-            <a:bodyPr wrap="none" rtlCol="0">
-              <a:spAutoFit/>
-            </a:bodyPr>
-            <a:lstStyle/>
-            <a:p>
-              <a:r>
-                <a:rPr lang="en-US" sz="1200" dirty="0" smtClean="0"/>
-                <a:t>Ion pump</a:t>
-              </a:r>
-              <a:endParaRPr lang="en-US" sz="1200" dirty="0"/>
-            </a:p>
-          </p:txBody>
-        </p:sp>
-        <p:sp>
-          <p:nvSpPr>
-            <p:cNvPr id="11" name="TextBox 10"/>
-            <p:cNvSpPr txBox="1"/>
-            <p:nvPr/>
-          </p:nvSpPr>
-          <p:spPr>
-            <a:xfrm>
-              <a:off x="4463094" y="1565631"/>
-              <a:ext cx="875561" cy="461665"/>
-            </a:xfrm>
-            <a:prstGeom prst="rect">
-              <a:avLst/>
-            </a:prstGeom>
-            <a:noFill/>
-          </p:spPr>
-          <p:txBody>
-            <a:bodyPr wrap="none" rtlCol="0">
-              <a:spAutoFit/>
-            </a:bodyPr>
-            <a:lstStyle/>
-            <a:p>
-              <a:r>
-                <a:rPr lang="en-US" sz="1200" dirty="0" smtClean="0"/>
-                <a:t>Push beam</a:t>
-              </a:r>
-            </a:p>
-            <a:p>
-              <a:r>
-                <a:rPr lang="en-US" sz="1200" dirty="0" smtClean="0"/>
-                <a:t>optics</a:t>
-              </a:r>
-              <a:endParaRPr lang="en-US" sz="1200" dirty="0"/>
-            </a:p>
-          </p:txBody>
-        </p:sp>
-        <p:sp>
-          <p:nvSpPr>
-            <p:cNvPr id="12" name="TextBox 11"/>
-            <p:cNvSpPr txBox="1"/>
-            <p:nvPr/>
-          </p:nvSpPr>
-          <p:spPr>
-            <a:xfrm>
-              <a:off x="7956448" y="3746893"/>
-              <a:ext cx="413896" cy="276999"/>
-            </a:xfrm>
-            <a:prstGeom prst="rect">
-              <a:avLst/>
-            </a:prstGeom>
-            <a:noFill/>
-          </p:spPr>
-          <p:txBody>
-            <a:bodyPr wrap="none" rtlCol="0">
-              <a:spAutoFit/>
-            </a:bodyPr>
-            <a:lstStyle/>
-            <a:p>
-              <a:r>
-                <a:rPr lang="en-US" sz="1200" dirty="0" smtClean="0"/>
-                <a:t>Cell</a:t>
-              </a:r>
-              <a:endParaRPr lang="en-US" sz="1200" dirty="0"/>
-            </a:p>
-          </p:txBody>
-        </p:sp>
-        <p:cxnSp>
-          <p:nvCxnSpPr>
-            <p:cNvPr id="14" name="Straight Arrow Connector 13"/>
-            <p:cNvCxnSpPr/>
-            <p:nvPr/>
-          </p:nvCxnSpPr>
-          <p:spPr>
-            <a:xfrm flipH="1">
-              <a:off x="7199586" y="1565631"/>
-              <a:ext cx="756862" cy="713174"/>
-            </a:xfrm>
-            <a:prstGeom prst="straightConnector1">
-              <a:avLst/>
-            </a:prstGeom>
-            <a:ln w="12700">
-              <a:tailEnd type="triangle"/>
-            </a:ln>
-          </p:spPr>
-          <p:style>
-            <a:lnRef idx="1">
-              <a:schemeClr val="dk1"/>
-            </a:lnRef>
-            <a:fillRef idx="0">
-              <a:schemeClr val="dk1"/>
-            </a:fillRef>
-            <a:effectRef idx="0">
-              <a:schemeClr val="dk1"/>
-            </a:effectRef>
-            <a:fontRef idx="minor">
-              <a:schemeClr val="tx1"/>
-            </a:fontRef>
-          </p:style>
-        </p:cxnSp>
-        <p:sp>
-          <p:nvSpPr>
-            <p:cNvPr id="15" name="TextBox 14"/>
-            <p:cNvSpPr txBox="1"/>
-            <p:nvPr/>
-          </p:nvSpPr>
-          <p:spPr>
-            <a:xfrm>
-              <a:off x="6122883" y="4669010"/>
-              <a:ext cx="1288430" cy="276999"/>
-            </a:xfrm>
-            <a:prstGeom prst="rect">
-              <a:avLst/>
-            </a:prstGeom>
-            <a:noFill/>
-          </p:spPr>
-          <p:txBody>
-            <a:bodyPr wrap="none" rtlCol="0">
-              <a:spAutoFit/>
-            </a:bodyPr>
-            <a:lstStyle/>
-            <a:p>
-              <a:r>
-                <a:rPr lang="en-US" sz="1200" dirty="0" smtClean="0"/>
-                <a:t>Mounting crosses</a:t>
-              </a:r>
-              <a:endParaRPr lang="en-US" sz="1200" dirty="0"/>
-            </a:p>
-          </p:txBody>
-        </p:sp>
-        <p:cxnSp>
-          <p:nvCxnSpPr>
-            <p:cNvPr id="16" name="Straight Arrow Connector 15"/>
-            <p:cNvCxnSpPr/>
-            <p:nvPr/>
-          </p:nvCxnSpPr>
-          <p:spPr>
-            <a:xfrm flipV="1">
-              <a:off x="7304690" y="4246179"/>
-              <a:ext cx="651758" cy="584220"/>
-            </a:xfrm>
-            <a:prstGeom prst="straightConnector1">
-              <a:avLst/>
-            </a:prstGeom>
-            <a:ln w="12700">
-              <a:tailEnd type="triangle"/>
-            </a:ln>
-          </p:spPr>
-          <p:style>
-            <a:lnRef idx="1">
-              <a:schemeClr val="dk1"/>
-            </a:lnRef>
-            <a:fillRef idx="0">
-              <a:schemeClr val="dk1"/>
-            </a:fillRef>
-            <a:effectRef idx="0">
-              <a:schemeClr val="dk1"/>
-            </a:effectRef>
-            <a:fontRef idx="minor">
-              <a:schemeClr val="tx1"/>
-            </a:fontRef>
-          </p:style>
-        </p:cxnSp>
-        <p:cxnSp>
-          <p:nvCxnSpPr>
-            <p:cNvPr id="19" name="Straight Arrow Connector 18"/>
-            <p:cNvCxnSpPr/>
-            <p:nvPr/>
-          </p:nvCxnSpPr>
-          <p:spPr>
-            <a:xfrm flipH="1" flipV="1">
-              <a:off x="5906814" y="2937788"/>
-              <a:ext cx="290050" cy="1892611"/>
-            </a:xfrm>
-            <a:prstGeom prst="straightConnector1">
-              <a:avLst/>
-            </a:prstGeom>
-            <a:ln w="12700">
-              <a:tailEnd type="triangle"/>
-            </a:ln>
-          </p:spPr>
-          <p:style>
-            <a:lnRef idx="1">
-              <a:schemeClr val="dk1"/>
-            </a:lnRef>
-            <a:fillRef idx="0">
-              <a:schemeClr val="dk1"/>
-            </a:fillRef>
-            <a:effectRef idx="0">
-              <a:schemeClr val="dk1"/>
-            </a:effectRef>
-            <a:fontRef idx="minor">
-              <a:schemeClr val="tx1"/>
-            </a:fontRef>
-          </p:style>
-        </p:cxnSp>
+          </p:grpSpPr>
+          <p:pic>
+            <p:nvPicPr>
+              <p:cNvPr id="4" name="Picture 3"/>
+              <p:cNvPicPr>
+                <a:picLocks noChangeAspect="1"/>
+              </p:cNvPicPr>
+              <p:nvPr/>
+            </p:nvPicPr>
+            <p:blipFill rotWithShape="1">
+              <a:blip r:embed="rId2">
+                <a:extLst>
+                  <a:ext uri="{28A0092B-C50C-407E-A947-70E740481C1C}">
+                    <a14:useLocalDpi xmlns:a14="http://schemas.microsoft.com/office/drawing/2010/main" val="0"/>
+                  </a:ext>
+                </a:extLst>
+              </a:blip>
+              <a:srcRect l="56091" t="4313" r="15387" b="50253"/>
+              <a:stretch/>
+            </p:blipFill>
+            <p:spPr>
+              <a:xfrm>
+                <a:off x="4820695" y="651788"/>
+                <a:ext cx="5486400" cy="4572001"/>
+              </a:xfrm>
+              <a:prstGeom prst="rect">
+                <a:avLst/>
+              </a:prstGeom>
+            </p:spPr>
+          </p:pic>
+          <p:sp>
+            <p:nvSpPr>
+              <p:cNvPr id="5" name="TextBox 4"/>
+              <p:cNvSpPr txBox="1"/>
+              <p:nvPr/>
+            </p:nvSpPr>
+            <p:spPr>
+              <a:xfrm rot="1842234">
+                <a:off x="9235858" y="4553401"/>
+                <a:ext cx="923523" cy="276999"/>
+              </a:xfrm>
+              <a:prstGeom prst="rect">
+                <a:avLst/>
+              </a:prstGeom>
+              <a:noFill/>
+            </p:spPr>
+            <p:txBody>
+              <a:bodyPr wrap="none" rtlCol="0">
+                <a:spAutoFit/>
+              </a:bodyPr>
+              <a:lstStyle/>
+              <a:p>
+                <a:r>
+                  <a:rPr lang="en-US" sz="1200" dirty="0" smtClean="0"/>
+                  <a:t>To 3-D MOT</a:t>
+                </a:r>
+                <a:endParaRPr lang="en-US" sz="1200" dirty="0"/>
+              </a:p>
+            </p:txBody>
+          </p:sp>
+          <p:sp>
+            <p:nvSpPr>
+              <p:cNvPr id="6" name="TextBox 5"/>
+              <p:cNvSpPr txBox="1"/>
+              <p:nvPr/>
+            </p:nvSpPr>
+            <p:spPr>
+              <a:xfrm>
+                <a:off x="8266386" y="4901493"/>
+                <a:ext cx="1046825" cy="276999"/>
+              </a:xfrm>
+              <a:prstGeom prst="rect">
+                <a:avLst/>
+              </a:prstGeom>
+              <a:noFill/>
+            </p:spPr>
+            <p:txBody>
+              <a:bodyPr wrap="none" rtlCol="0">
+                <a:spAutoFit/>
+              </a:bodyPr>
+              <a:lstStyle/>
+              <a:p>
+                <a:r>
+                  <a:rPr lang="en-US" sz="1200" dirty="0" smtClean="0"/>
+                  <a:t>Rotatable flag</a:t>
+                </a:r>
+                <a:endParaRPr lang="en-US" sz="1200" dirty="0"/>
+              </a:p>
+            </p:txBody>
+          </p:sp>
+          <p:sp>
+            <p:nvSpPr>
+              <p:cNvPr id="7" name="TextBox 6"/>
+              <p:cNvSpPr txBox="1"/>
+              <p:nvPr/>
+            </p:nvSpPr>
+            <p:spPr>
+              <a:xfrm>
+                <a:off x="8902955" y="2278805"/>
+                <a:ext cx="836704" cy="276999"/>
+              </a:xfrm>
+              <a:prstGeom prst="rect">
+                <a:avLst/>
+              </a:prstGeom>
+              <a:noFill/>
+            </p:spPr>
+            <p:txBody>
+              <a:bodyPr wrap="none" rtlCol="0">
+                <a:spAutoFit/>
+              </a:bodyPr>
+              <a:lstStyle/>
+              <a:p>
+                <a:r>
+                  <a:rPr lang="en-US" sz="1200" dirty="0" smtClean="0"/>
+                  <a:t>Gate valve</a:t>
+                </a:r>
+                <a:endParaRPr lang="en-US" sz="1200" dirty="0"/>
+              </a:p>
+            </p:txBody>
+          </p:sp>
+          <p:sp>
+            <p:nvSpPr>
+              <p:cNvPr id="8" name="TextBox 7"/>
+              <p:cNvSpPr txBox="1"/>
+              <p:nvPr/>
+            </p:nvSpPr>
+            <p:spPr>
+              <a:xfrm rot="17022770">
+                <a:off x="4724198" y="2948151"/>
+                <a:ext cx="605679" cy="276999"/>
+              </a:xfrm>
+              <a:prstGeom prst="rect">
+                <a:avLst/>
+              </a:prstGeom>
+              <a:noFill/>
+            </p:spPr>
+            <p:txBody>
+              <a:bodyPr wrap="none" rtlCol="0">
+                <a:spAutoFit/>
+              </a:bodyPr>
+              <a:lstStyle/>
+              <a:p>
+                <a:r>
+                  <a:rPr lang="en-US" sz="1200" dirty="0" smtClean="0"/>
+                  <a:t>K oven</a:t>
+                </a:r>
+                <a:endParaRPr lang="en-US" sz="1200" dirty="0"/>
+              </a:p>
+            </p:txBody>
+          </p:sp>
+          <p:sp>
+            <p:nvSpPr>
+              <p:cNvPr id="9" name="TextBox 8"/>
+              <p:cNvSpPr txBox="1"/>
+              <p:nvPr/>
+            </p:nvSpPr>
+            <p:spPr>
+              <a:xfrm>
+                <a:off x="5454868" y="1008992"/>
+                <a:ext cx="689035" cy="276999"/>
+              </a:xfrm>
+              <a:prstGeom prst="rect">
+                <a:avLst/>
+              </a:prstGeom>
+              <a:noFill/>
+            </p:spPr>
+            <p:txBody>
+              <a:bodyPr wrap="none" rtlCol="0">
+                <a:spAutoFit/>
+              </a:bodyPr>
+              <a:lstStyle/>
+              <a:p>
+                <a:r>
+                  <a:rPr lang="en-US" sz="1200" dirty="0" err="1" smtClean="0"/>
+                  <a:t>Rb</a:t>
+                </a:r>
+                <a:r>
+                  <a:rPr lang="en-US" sz="1200" dirty="0" smtClean="0"/>
+                  <a:t> oven</a:t>
+                </a:r>
+                <a:endParaRPr lang="en-US" sz="1200" dirty="0"/>
+              </a:p>
+            </p:txBody>
+          </p:sp>
+          <p:sp>
+            <p:nvSpPr>
+              <p:cNvPr id="10" name="TextBox 9"/>
+              <p:cNvSpPr txBox="1"/>
+              <p:nvPr/>
+            </p:nvSpPr>
+            <p:spPr>
+              <a:xfrm>
+                <a:off x="7874291" y="1343197"/>
+                <a:ext cx="784189" cy="276999"/>
+              </a:xfrm>
+              <a:prstGeom prst="rect">
+                <a:avLst/>
+              </a:prstGeom>
+              <a:noFill/>
+            </p:spPr>
+            <p:txBody>
+              <a:bodyPr wrap="none" rtlCol="0">
+                <a:spAutoFit/>
+              </a:bodyPr>
+              <a:lstStyle/>
+              <a:p>
+                <a:r>
+                  <a:rPr lang="en-US" sz="1200" dirty="0" smtClean="0"/>
+                  <a:t>Ion pump</a:t>
+                </a:r>
+                <a:endParaRPr lang="en-US" sz="1200" dirty="0"/>
+              </a:p>
+            </p:txBody>
+          </p:sp>
+          <p:sp>
+            <p:nvSpPr>
+              <p:cNvPr id="11" name="TextBox 10"/>
+              <p:cNvSpPr txBox="1"/>
+              <p:nvPr/>
+            </p:nvSpPr>
+            <p:spPr>
+              <a:xfrm>
+                <a:off x="4463094" y="1565631"/>
+                <a:ext cx="875561" cy="461665"/>
+              </a:xfrm>
+              <a:prstGeom prst="rect">
+                <a:avLst/>
+              </a:prstGeom>
+              <a:noFill/>
+            </p:spPr>
+            <p:txBody>
+              <a:bodyPr wrap="none" rtlCol="0">
+                <a:spAutoFit/>
+              </a:bodyPr>
+              <a:lstStyle/>
+              <a:p>
+                <a:r>
+                  <a:rPr lang="en-US" sz="1200" dirty="0" smtClean="0"/>
+                  <a:t>Push beam</a:t>
+                </a:r>
+              </a:p>
+              <a:p>
+                <a:r>
+                  <a:rPr lang="en-US" sz="1200" dirty="0" smtClean="0"/>
+                  <a:t>optics</a:t>
+                </a:r>
+                <a:endParaRPr lang="en-US" sz="1200" dirty="0"/>
+              </a:p>
+            </p:txBody>
+          </p:sp>
+          <p:sp>
+            <p:nvSpPr>
+              <p:cNvPr id="12" name="TextBox 11"/>
+              <p:cNvSpPr txBox="1"/>
+              <p:nvPr/>
+            </p:nvSpPr>
+            <p:spPr>
+              <a:xfrm>
+                <a:off x="7956448" y="3746893"/>
+                <a:ext cx="413896" cy="276999"/>
+              </a:xfrm>
+              <a:prstGeom prst="rect">
+                <a:avLst/>
+              </a:prstGeom>
+              <a:noFill/>
+            </p:spPr>
+            <p:txBody>
+              <a:bodyPr wrap="none" rtlCol="0">
+                <a:spAutoFit/>
+              </a:bodyPr>
+              <a:lstStyle/>
+              <a:p>
+                <a:r>
+                  <a:rPr lang="en-US" sz="1200" dirty="0" smtClean="0"/>
+                  <a:t>Cell</a:t>
+                </a:r>
+                <a:endParaRPr lang="en-US" sz="1200" dirty="0"/>
+              </a:p>
+            </p:txBody>
+          </p:sp>
+          <p:cxnSp>
+            <p:nvCxnSpPr>
+              <p:cNvPr id="14" name="Straight Arrow Connector 13"/>
+              <p:cNvCxnSpPr/>
+              <p:nvPr/>
+            </p:nvCxnSpPr>
+            <p:spPr>
+              <a:xfrm flipH="1">
+                <a:off x="7199586" y="1565631"/>
+                <a:ext cx="756862" cy="713174"/>
+              </a:xfrm>
+              <a:prstGeom prst="straightConnector1">
+                <a:avLst/>
+              </a:prstGeom>
+              <a:ln w="12700">
+                <a:tailEnd type="triangle"/>
+              </a:ln>
+            </p:spPr>
+            <p:style>
+              <a:lnRef idx="1">
+                <a:schemeClr val="dk1"/>
+              </a:lnRef>
+              <a:fillRef idx="0">
+                <a:schemeClr val="dk1"/>
+              </a:fillRef>
+              <a:effectRef idx="0">
+                <a:schemeClr val="dk1"/>
+              </a:effectRef>
+              <a:fontRef idx="minor">
+                <a:schemeClr val="tx1"/>
+              </a:fontRef>
+            </p:style>
+          </p:cxnSp>
+          <p:sp>
+            <p:nvSpPr>
+              <p:cNvPr id="15" name="TextBox 14"/>
+              <p:cNvSpPr txBox="1"/>
+              <p:nvPr/>
+            </p:nvSpPr>
+            <p:spPr>
+              <a:xfrm>
+                <a:off x="6122883" y="4669010"/>
+                <a:ext cx="1288430" cy="276999"/>
+              </a:xfrm>
+              <a:prstGeom prst="rect">
+                <a:avLst/>
+              </a:prstGeom>
+              <a:noFill/>
+            </p:spPr>
+            <p:txBody>
+              <a:bodyPr wrap="none" rtlCol="0">
+                <a:spAutoFit/>
+              </a:bodyPr>
+              <a:lstStyle/>
+              <a:p>
+                <a:r>
+                  <a:rPr lang="en-US" sz="1200" dirty="0" smtClean="0"/>
+                  <a:t>Mounting crosses</a:t>
+                </a:r>
+                <a:endParaRPr lang="en-US" sz="1200" dirty="0"/>
+              </a:p>
+            </p:txBody>
+          </p:sp>
+          <p:cxnSp>
+            <p:nvCxnSpPr>
+              <p:cNvPr id="16" name="Straight Arrow Connector 15"/>
+              <p:cNvCxnSpPr/>
+              <p:nvPr/>
+            </p:nvCxnSpPr>
+            <p:spPr>
+              <a:xfrm flipV="1">
+                <a:off x="7304690" y="4246179"/>
+                <a:ext cx="651758" cy="584220"/>
+              </a:xfrm>
+              <a:prstGeom prst="straightConnector1">
+                <a:avLst/>
+              </a:prstGeom>
+              <a:ln w="12700">
+                <a:tailEnd type="triangle"/>
+              </a:ln>
+            </p:spPr>
+            <p:style>
+              <a:lnRef idx="1">
+                <a:schemeClr val="dk1"/>
+              </a:lnRef>
+              <a:fillRef idx="0">
+                <a:schemeClr val="dk1"/>
+              </a:fillRef>
+              <a:effectRef idx="0">
+                <a:schemeClr val="dk1"/>
+              </a:effectRef>
+              <a:fontRef idx="minor">
+                <a:schemeClr val="tx1"/>
+              </a:fontRef>
+            </p:style>
+          </p:cxnSp>
+          <p:cxnSp>
+            <p:nvCxnSpPr>
+              <p:cNvPr id="19" name="Straight Arrow Connector 18"/>
+              <p:cNvCxnSpPr/>
+              <p:nvPr/>
+            </p:nvCxnSpPr>
+            <p:spPr>
+              <a:xfrm flipH="1" flipV="1">
+                <a:off x="5906814" y="2937788"/>
+                <a:ext cx="290050" cy="1892611"/>
+              </a:xfrm>
+              <a:prstGeom prst="straightConnector1">
+                <a:avLst/>
+              </a:prstGeom>
+              <a:ln w="12700">
+                <a:tailEnd type="triangle"/>
+              </a:ln>
+            </p:spPr>
+            <p:style>
+              <a:lnRef idx="1">
+                <a:schemeClr val="dk1"/>
+              </a:lnRef>
+              <a:fillRef idx="0">
+                <a:schemeClr val="dk1"/>
+              </a:fillRef>
+              <a:effectRef idx="0">
+                <a:schemeClr val="dk1"/>
+              </a:effectRef>
+              <a:fontRef idx="minor">
+                <a:schemeClr val="tx1"/>
+              </a:fontRef>
+            </p:style>
+          </p:cxnSp>
+        </p:grpSp>
       </p:grpSp>
     </p:spTree>
     <p:extLst>
@@ -4655,7 +4718,7 @@
           </p:nvSpPr>
           <p:spPr>
             <a:xfrm>
-              <a:off x="5379884" y="3098166"/>
+              <a:off x="5703448" y="3119268"/>
               <a:ext cx="852349" cy="276999"/>
             </a:xfrm>
             <a:prstGeom prst="rect">
@@ -4688,15 +4751,13 @@
         <p:cxnSp>
           <p:nvCxnSpPr>
             <p:cNvPr id="18" name="Straight Arrow Connector 17"/>
-            <p:cNvCxnSpPr>
-              <a:stCxn id="17" idx="2"/>
-            </p:cNvCxnSpPr>
+            <p:cNvCxnSpPr/>
             <p:nvPr/>
           </p:nvCxnSpPr>
           <p:spPr>
             <a:xfrm flipH="1">
-              <a:off x="5743741" y="3375165"/>
-              <a:ext cx="62318" cy="447179"/>
+              <a:off x="5806059" y="3411120"/>
+              <a:ext cx="208183" cy="444289"/>
             </a:xfrm>
             <a:prstGeom prst="straightConnector1">
               <a:avLst/>
@@ -4731,7 +4792,7 @@
           </p:nvSpPr>
           <p:spPr>
             <a:xfrm>
-              <a:off x="6232233" y="2831674"/>
+              <a:off x="6241423" y="2650262"/>
               <a:ext cx="839525" cy="276999"/>
             </a:xfrm>
             <a:prstGeom prst="rect">
@@ -4777,8 +4838,8 @@
           </p:nvCxnSpPr>
           <p:spPr>
             <a:xfrm flipH="1">
-              <a:off x="6585641" y="3098166"/>
-              <a:ext cx="66354" cy="138499"/>
+              <a:off x="6585641" y="2927261"/>
+              <a:ext cx="66355" cy="309404"/>
             </a:xfrm>
             <a:prstGeom prst="straightConnector1">
               <a:avLst/>
@@ -4813,7 +4874,7 @@
           </p:nvSpPr>
           <p:spPr>
             <a:xfrm>
-              <a:off x="6165878" y="2512487"/>
+              <a:off x="5950174" y="2350003"/>
               <a:ext cx="803425" cy="276999"/>
             </a:xfrm>
             <a:prstGeom prst="rect">
@@ -5010,9 +5071,9 @@
             <p:nvPr/>
           </p:nvCxnSpPr>
           <p:spPr>
-            <a:xfrm>
-              <a:off x="5806059" y="3411120"/>
-              <a:ext cx="86026" cy="279966"/>
+            <a:xfrm flipH="1">
+              <a:off x="5986151" y="3403763"/>
+              <a:ext cx="14922" cy="322126"/>
             </a:xfrm>
             <a:prstGeom prst="straightConnector1">
               <a:avLst/>
@@ -5049,7 +5110,7 @@
           </p:nvCxnSpPr>
           <p:spPr>
             <a:xfrm flipH="1">
-              <a:off x="5460642" y="3108673"/>
+              <a:off x="5469832" y="2927261"/>
               <a:ext cx="1191354" cy="351581"/>
             </a:xfrm>
             <a:prstGeom prst="straightConnector1">
@@ -5359,7 +5420,7 @@
           </p:nvSpPr>
           <p:spPr>
             <a:xfrm>
-              <a:off x="6567590" y="3334713"/>
+              <a:off x="6692536" y="2788004"/>
               <a:ext cx="1194558" cy="461665"/>
             </a:xfrm>
             <a:prstGeom prst="rect">
@@ -5442,9 +5503,9 @@
             <p:nvPr/>
           </p:nvCxnSpPr>
           <p:spPr>
-            <a:xfrm flipH="1" flipV="1">
-              <a:off x="6044086" y="3578410"/>
-              <a:ext cx="617100" cy="13296"/>
+            <a:xfrm flipH="1">
+              <a:off x="6044086" y="3204260"/>
+              <a:ext cx="749344" cy="374150"/>
             </a:xfrm>
             <a:prstGeom prst="straightConnector1">
               <a:avLst/>
@@ -5479,8 +5540,8 @@
           </p:nvCxnSpPr>
           <p:spPr>
             <a:xfrm flipH="1">
-              <a:off x="6328374" y="3596390"/>
-              <a:ext cx="323622" cy="355917"/>
+              <a:off x="6328374" y="3204260"/>
+              <a:ext cx="465056" cy="748047"/>
             </a:xfrm>
             <a:prstGeom prst="straightConnector1">
               <a:avLst/>

</xml_diff>